<commit_message>
aggiustato probelma con lo stop
</commit_message>
<xml_diff>
--- a/iss2021_resumablebw/userDocs/img/Legenda.pptx
+++ b/iss2021_resumablebw/userDocs/img/Legenda.pptx
@@ -1453,7 +1453,7 @@
             <a:fld id="{E1625027-F480-45BE-98EB-E4ABD50F7C43}" type="datetime1">
               <a:rPr lang="en-US"/>
               <a:pPr lvl="0"/>
-              <a:t>3/20/2021</a:t>
+              <a:t>3/23/2021</a:t>
             </a:fld>
             <a:endParaRPr lang="en-US"/>
           </a:p>
@@ -1658,7 +1658,7 @@
             <a:fld id="{2B127D2E-5ADA-4DDC-9F1A-AD6A016AA88A}" type="datetime1">
               <a:rPr lang="en-US"/>
               <a:pPr lvl="0"/>
-              <a:t>3/20/2021</a:t>
+              <a:t>3/23/2021</a:t>
             </a:fld>
             <a:endParaRPr lang="en-US"/>
           </a:p>
@@ -1908,7 +1908,7 @@
             <a:fld id="{DC8D2D60-A35A-4E29-90AF-F462F3828E68}" type="datetime1">
               <a:rPr lang="en-US"/>
               <a:pPr lvl="0"/>
-              <a:t>3/20/2021</a:t>
+              <a:t>3/23/2021</a:t>
             </a:fld>
             <a:endParaRPr lang="en-US"/>
           </a:p>
@@ -2246,7 +2246,7 @@
             <a:fld id="{28219253-5FC5-4A40-8333-D1B15AC5878A}" type="datetime1">
               <a:rPr lang="en-US"/>
               <a:pPr lvl="0"/>
-              <a:t>3/20/2021</a:t>
+              <a:t>3/23/2021</a:t>
             </a:fld>
             <a:endParaRPr lang="en-US"/>
           </a:p>
@@ -2496,7 +2496,7 @@
             <a:fld id="{33CA4D83-3349-4ABB-88EE-6E4E7B0BB022}" type="datetime1">
               <a:rPr lang="en-US"/>
               <a:pPr lvl="0"/>
-              <a:t>3/20/2021</a:t>
+              <a:t>3/23/2021</a:t>
             </a:fld>
             <a:endParaRPr lang="en-US"/>
           </a:p>
@@ -2876,7 +2876,7 @@
             <a:fld id="{2FB5C852-7CCC-490C-814F-DFECD5F43B20}" type="datetime1">
               <a:rPr lang="en-US"/>
               <a:pPr lvl="0"/>
-              <a:t>3/20/2021</a:t>
+              <a:t>3/23/2021</a:t>
             </a:fld>
             <a:endParaRPr lang="en-US"/>
           </a:p>
@@ -3110,7 +3110,7 @@
             <a:fld id="{7B2A1F4C-93D8-43D7-8339-D733494904AF}" type="datetime1">
               <a:rPr lang="en-US"/>
               <a:pPr lvl="0"/>
-              <a:t>3/20/2021</a:t>
+              <a:t>3/23/2021</a:t>
             </a:fld>
             <a:endParaRPr lang="en-US"/>
           </a:p>
@@ -3354,7 +3354,7 @@
             <a:fld id="{77885217-A614-4057-B794-FF8AEFCE0435}" type="datetime1">
               <a:rPr lang="en-US"/>
               <a:pPr lvl="0"/>
-              <a:t>3/20/2021</a:t>
+              <a:t>3/23/2021</a:t>
             </a:fld>
             <a:endParaRPr lang="en-US"/>
           </a:p>
@@ -3588,7 +3588,7 @@
             <a:fld id="{D0DACD68-29B9-4EF3-AEDA-C2F359F2DD76}" type="datetime1">
               <a:rPr lang="en-US"/>
               <a:pPr lvl="0"/>
-              <a:t>3/20/2021</a:t>
+              <a:t>3/23/2021</a:t>
             </a:fld>
             <a:endParaRPr lang="en-US"/>
           </a:p>
@@ -3797,7 +3797,7 @@
             <a:fld id="{06E0725F-6EB9-4ECD-B0CE-1D38B1127686}" type="datetime1">
               <a:rPr lang="en-US"/>
               <a:pPr lvl="0"/>
-              <a:t>3/20/2021</a:t>
+              <a:t>3/23/2021</a:t>
             </a:fld>
             <a:endParaRPr lang="en-US"/>
           </a:p>
@@ -4114,7 +4114,7 @@
             <a:fld id="{4C942382-4B6B-45E1-9E36-EC8B67CEA045}" type="datetime1">
               <a:rPr lang="en-US"/>
               <a:pPr lvl="0"/>
-              <a:t>3/20/2021</a:t>
+              <a:t>3/23/2021</a:t>
             </a:fld>
             <a:endParaRPr lang="en-US"/>
           </a:p>
@@ -4513,7 +4513,7 @@
             <a:fld id="{7D3D84F2-FEA2-4427-96E5-10B973ED4870}" type="datetime1">
               <a:rPr lang="en-US"/>
               <a:pPr lvl="0"/>
-              <a:t>3/20/2021</a:t>
+              <a:t>3/23/2021</a:t>
             </a:fld>
             <a:endParaRPr lang="en-US"/>
           </a:p>
@@ -4674,7 +4674,7 @@
             <a:fld id="{B7AF3369-AE36-4F4C-A2F2-CD9A19A2C3F5}" type="datetime1">
               <a:rPr lang="en-US"/>
               <a:pPr lvl="0"/>
-              <a:t>3/20/2021</a:t>
+              <a:t>3/23/2021</a:t>
             </a:fld>
             <a:endParaRPr lang="en-US"/>
           </a:p>
@@ -4803,7 +4803,7 @@
             <a:fld id="{1DBFF290-4D61-45AA-9912-220341DCFF82}" type="datetime1">
               <a:rPr lang="en-US"/>
               <a:pPr lvl="0"/>
-              <a:t>3/20/2021</a:t>
+              <a:t>3/23/2021</a:t>
             </a:fld>
             <a:endParaRPr lang="en-US"/>
           </a:p>
@@ -5086,7 +5086,7 @@
             <a:fld id="{394810FF-4C92-4868-8A78-69B7E79AAD23}" type="datetime1">
               <a:rPr lang="en-US"/>
               <a:pPr lvl="0"/>
-              <a:t>3/20/2021</a:t>
+              <a:t>3/23/2021</a:t>
             </a:fld>
             <a:endParaRPr lang="en-US"/>
           </a:p>
@@ -5330,7 +5330,7 @@
             <a:fld id="{5EEF1104-63C8-41E5-ADC2-4624C67A1313}" type="datetime1">
               <a:rPr lang="en-US"/>
               <a:pPr lvl="0"/>
-              <a:t>3/20/2021</a:t>
+              <a:t>3/23/2021</a:t>
             </a:fld>
             <a:endParaRPr lang="en-US"/>
           </a:p>
@@ -6816,7 +6816,7 @@
             <a:fld id="{3431AD46-0528-4BA3-9348-B3C09F91749D}" type="datetime1">
               <a:rPr lang="en-US"/>
               <a:pPr lvl="0"/>
-              <a:t>3/20/2021</a:t>
+              <a:t>3/23/2021</a:t>
             </a:fld>
             <a:endParaRPr lang="en-US"/>
           </a:p>
@@ -14326,10 +14326,10 @@
       </p:grpSpPr>
       <p:grpSp>
         <p:nvGrpSpPr>
-          <p:cNvPr id="1033" name="Gruppo 1032">
+          <p:cNvPr id="4" name="Gruppo 3">
             <a:extLst>
               <a:ext uri="{FF2B5EF4-FFF2-40B4-BE49-F238E27FC236}">
-                <a16:creationId xmlns:a16="http://schemas.microsoft.com/office/drawing/2014/main" id="{2370E3D6-E088-4A46-B01A-EE473C18A455}"/>
+                <a16:creationId xmlns:a16="http://schemas.microsoft.com/office/drawing/2014/main" id="{E89C8712-596F-4B9B-9C2C-0CA1746D3F32}"/>
               </a:ext>
             </a:extLst>
           </p:cNvPr>
@@ -14338,18 +14338,18 @@
         </p:nvGrpSpPr>
         <p:grpSpPr>
           <a:xfrm>
-            <a:off x="875209" y="562537"/>
+            <a:off x="828075" y="557110"/>
             <a:ext cx="14158237" cy="5562047"/>
-            <a:chOff x="875209" y="562537"/>
+            <a:chOff x="828075" y="557110"/>
             <a:chExt cx="14158237" cy="5562047"/>
           </a:xfrm>
         </p:grpSpPr>
         <p:grpSp>
           <p:nvGrpSpPr>
-            <p:cNvPr id="1032" name="Gruppo 1031">
+            <p:cNvPr id="25" name="Gruppo 24">
               <a:extLst>
                 <a:ext uri="{FF2B5EF4-FFF2-40B4-BE49-F238E27FC236}">
-                  <a16:creationId xmlns:a16="http://schemas.microsoft.com/office/drawing/2014/main" id="{137D7A88-977F-4088-BACC-92CFCF714D86}"/>
+                  <a16:creationId xmlns:a16="http://schemas.microsoft.com/office/drawing/2014/main" id="{86A8F7E1-2E48-4CC5-BD7A-9E7D6CDAF709}"/>
                 </a:ext>
               </a:extLst>
             </p:cNvPr>
@@ -14358,18 +14358,1484 @@
           </p:nvGrpSpPr>
           <p:grpSpPr>
             <a:xfrm>
-              <a:off x="875209" y="562537"/>
-              <a:ext cx="9615642" cy="5562047"/>
-              <a:chOff x="1466337" y="525591"/>
-              <a:chExt cx="9615642" cy="5562047"/>
+              <a:off x="828075" y="557110"/>
+              <a:ext cx="14158237" cy="5562047"/>
+              <a:chOff x="828075" y="557110"/>
+              <a:chExt cx="14158237" cy="5562047"/>
             </a:xfrm>
           </p:grpSpPr>
+          <p:grpSp>
+            <p:nvGrpSpPr>
+              <p:cNvPr id="1033" name="Gruppo 1032">
+                <a:extLst>
+                  <a:ext uri="{FF2B5EF4-FFF2-40B4-BE49-F238E27FC236}">
+                    <a16:creationId xmlns:a16="http://schemas.microsoft.com/office/drawing/2014/main" id="{2370E3D6-E088-4A46-B01A-EE473C18A455}"/>
+                  </a:ext>
+                </a:extLst>
+              </p:cNvPr>
+              <p:cNvGrpSpPr/>
+              <p:nvPr/>
+            </p:nvGrpSpPr>
+            <p:grpSpPr>
+              <a:xfrm>
+                <a:off x="828075" y="557110"/>
+                <a:ext cx="14158237" cy="5562047"/>
+                <a:chOff x="875209" y="562537"/>
+                <a:chExt cx="14158237" cy="5562047"/>
+              </a:xfrm>
+            </p:grpSpPr>
+            <p:grpSp>
+              <p:nvGrpSpPr>
+                <p:cNvPr id="1032" name="Gruppo 1031">
+                  <a:extLst>
+                    <a:ext uri="{FF2B5EF4-FFF2-40B4-BE49-F238E27FC236}">
+                      <a16:creationId xmlns:a16="http://schemas.microsoft.com/office/drawing/2014/main" id="{137D7A88-977F-4088-BACC-92CFCF714D86}"/>
+                    </a:ext>
+                  </a:extLst>
+                </p:cNvPr>
+                <p:cNvGrpSpPr/>
+                <p:nvPr/>
+              </p:nvGrpSpPr>
+              <p:grpSpPr>
+                <a:xfrm>
+                  <a:off x="875209" y="562537"/>
+                  <a:ext cx="9615642" cy="5562047"/>
+                  <a:chOff x="1466337" y="525591"/>
+                  <a:chExt cx="9615642" cy="5562047"/>
+                </a:xfrm>
+              </p:grpSpPr>
+              <p:sp>
+                <p:nvSpPr>
+                  <p:cNvPr id="1028" name="Ovale 1027">
+                    <a:extLst>
+                      <a:ext uri="{FF2B5EF4-FFF2-40B4-BE49-F238E27FC236}">
+                        <a16:creationId xmlns:a16="http://schemas.microsoft.com/office/drawing/2014/main" id="{7286CBFB-BBE1-475D-B9C7-9E7E0B39EF5E}"/>
+                      </a:ext>
+                    </a:extLst>
+                  </p:cNvPr>
+                  <p:cNvSpPr/>
+                  <p:nvPr/>
+                </p:nvSpPr>
+                <p:spPr>
+                  <a:xfrm>
+                    <a:off x="1466337" y="525591"/>
+                    <a:ext cx="9615642" cy="5562047"/>
+                  </a:xfrm>
+                  <a:prstGeom prst="ellipse">
+                    <a:avLst/>
+                  </a:prstGeom>
+                  <a:solidFill>
+                    <a:schemeClr val="accent5">
+                      <a:lumMod val="20%"/>
+                      <a:lumOff val="80%"/>
+                    </a:schemeClr>
+                  </a:solidFill>
+                  <a:ln>
+                    <a:solidFill>
+                      <a:schemeClr val="accent5">
+                        <a:lumMod val="60%"/>
+                        <a:lumOff val="40%"/>
+                      </a:schemeClr>
+                    </a:solidFill>
+                  </a:ln>
+                </p:spPr>
+                <p:style>
+                  <a:lnRef idx="2">
+                    <a:schemeClr val="accent1">
+                      <a:shade val="50%"/>
+                    </a:schemeClr>
+                  </a:lnRef>
+                  <a:fillRef idx="1">
+                    <a:schemeClr val="accent1"/>
+                  </a:fillRef>
+                  <a:effectRef idx="0">
+                    <a:schemeClr val="accent1"/>
+                  </a:effectRef>
+                  <a:fontRef idx="minor">
+                    <a:schemeClr val="lt1"/>
+                  </a:fontRef>
+                </p:style>
+                <p:txBody>
+                  <a:bodyPr rtlCol="0" anchor="ctr"/>
+                  <a:lstStyle/>
+                  <a:p>
+                    <a:pPr algn="ctr"/>
+                    <a:endParaRPr lang="it-IT" dirty="0"/>
+                  </a:p>
+                </p:txBody>
+              </p:sp>
+              <p:sp>
+                <p:nvSpPr>
+                  <p:cNvPr id="3" name="Rettangolo con angoli arrotondati 2">
+                    <a:extLst>
+                      <a:ext uri="{FF2B5EF4-FFF2-40B4-BE49-F238E27FC236}">
+                        <a16:creationId xmlns:a16="http://schemas.microsoft.com/office/drawing/2014/main" id="{FD32C25D-D9BE-4028-90E5-C27A6FD3273C}"/>
+                      </a:ext>
+                    </a:extLst>
+                  </p:cNvPr>
+                  <p:cNvSpPr/>
+                  <p:nvPr/>
+                </p:nvSpPr>
+                <p:spPr>
+                  <a:xfrm>
+                    <a:off x="2119474" y="2094347"/>
+                    <a:ext cx="1789102" cy="397163"/>
+                  </a:xfrm>
+                  <a:prstGeom prst="roundRect">
+                    <a:avLst/>
+                  </a:prstGeom>
+                  <a:solidFill>
+                    <a:schemeClr val="accent4">
+                      <a:lumMod val="40%"/>
+                      <a:lumOff val="60%"/>
+                    </a:schemeClr>
+                  </a:solidFill>
+                  <a:ln>
+                    <a:solidFill>
+                      <a:schemeClr val="tx1"/>
+                    </a:solidFill>
+                  </a:ln>
+                </p:spPr>
+                <p:style>
+                  <a:lnRef idx="2">
+                    <a:schemeClr val="accent1">
+                      <a:shade val="50%"/>
+                    </a:schemeClr>
+                  </a:lnRef>
+                  <a:fillRef idx="1">
+                    <a:schemeClr val="accent1"/>
+                  </a:fillRef>
+                  <a:effectRef idx="0">
+                    <a:schemeClr val="accent1"/>
+                  </a:effectRef>
+                  <a:fontRef idx="minor">
+                    <a:schemeClr val="lt1"/>
+                  </a:fontRef>
+                </p:style>
+                <p:txBody>
+                  <a:bodyPr rtlCol="0" anchor="ctr"/>
+                  <a:lstStyle/>
+                  <a:p>
+                    <a:pPr algn="ctr"/>
+                    <a:r>
+                      <a:rPr lang="it-IT" sz="1400" dirty="0" err="1">
+                        <a:solidFill>
+                          <a:schemeClr val="tx1"/>
+                        </a:solidFill>
+                      </a:rPr>
+                      <a:t>RobotMovesInfo</a:t>
+                    </a:r>
+                    <a:endParaRPr lang="it-IT" sz="1400" dirty="0">
+                      <a:solidFill>
+                        <a:schemeClr val="tx1"/>
+                      </a:solidFill>
+                    </a:endParaRPr>
+                  </a:p>
+                </p:txBody>
+              </p:sp>
+              <p:sp>
+                <p:nvSpPr>
+                  <p:cNvPr id="5" name="Rettangolo con angoli arrotondati 4">
+                    <a:extLst>
+                      <a:ext uri="{FF2B5EF4-FFF2-40B4-BE49-F238E27FC236}">
+                        <a16:creationId xmlns:a16="http://schemas.microsoft.com/office/drawing/2014/main" id="{4C1AFBBB-15CB-48D1-B81E-0C680308DB9D}"/>
+                      </a:ext>
+                    </a:extLst>
+                  </p:cNvPr>
+                  <p:cNvSpPr/>
+                  <p:nvPr/>
+                </p:nvSpPr>
+                <p:spPr>
+                  <a:xfrm>
+                    <a:off x="1729990" y="2909453"/>
+                    <a:ext cx="2568071" cy="397163"/>
+                  </a:xfrm>
+                  <a:prstGeom prst="roundRect">
+                    <a:avLst/>
+                  </a:prstGeom>
+                  <a:solidFill>
+                    <a:schemeClr val="accent4">
+                      <a:lumMod val="40%"/>
+                      <a:lumOff val="60%"/>
+                    </a:schemeClr>
+                  </a:solidFill>
+                  <a:ln>
+                    <a:solidFill>
+                      <a:schemeClr val="tx1"/>
+                    </a:solidFill>
+                  </a:ln>
+                </p:spPr>
+                <p:style>
+                  <a:lnRef idx="2">
+                    <a:schemeClr val="accent1">
+                      <a:shade val="50%"/>
+                    </a:schemeClr>
+                  </a:lnRef>
+                  <a:fillRef idx="1">
+                    <a:schemeClr val="accent1"/>
+                  </a:fillRef>
+                  <a:effectRef idx="0">
+                    <a:schemeClr val="accent1"/>
+                  </a:effectRef>
+                  <a:fontRef idx="minor">
+                    <a:schemeClr val="lt1"/>
+                  </a:fontRef>
+                </p:style>
+                <p:txBody>
+                  <a:bodyPr rtlCol="0" anchor="ctr"/>
+                  <a:lstStyle/>
+                  <a:p>
+                    <a:pPr algn="ctr"/>
+                    <a:r>
+                      <a:rPr lang="it-IT" sz="1400" dirty="0" err="1">
+                        <a:solidFill>
+                          <a:schemeClr val="tx1"/>
+                        </a:solidFill>
+                      </a:rPr>
+                      <a:t>RobotBoundaryLogic</a:t>
+                    </a:r>
+                    <a:endParaRPr lang="it-IT" sz="1400" dirty="0">
+                      <a:solidFill>
+                        <a:schemeClr val="tx1"/>
+                      </a:solidFill>
+                    </a:endParaRPr>
+                  </a:p>
+                </p:txBody>
+              </p:sp>
+              <p:sp>
+                <p:nvSpPr>
+                  <p:cNvPr id="6" name="Rettangolo con angoli arrotondati 5">
+                    <a:extLst>
+                      <a:ext uri="{FF2B5EF4-FFF2-40B4-BE49-F238E27FC236}">
+                        <a16:creationId xmlns:a16="http://schemas.microsoft.com/office/drawing/2014/main" id="{7C001593-35D5-40BC-B376-68ECC54B021E}"/>
+                      </a:ext>
+                    </a:extLst>
+                  </p:cNvPr>
+                  <p:cNvSpPr/>
+                  <p:nvPr/>
+                </p:nvSpPr>
+                <p:spPr>
+                  <a:xfrm>
+                    <a:off x="8386632" y="2349836"/>
+                    <a:ext cx="1634836" cy="397163"/>
+                  </a:xfrm>
+                  <a:prstGeom prst="roundRect">
+                    <a:avLst/>
+                  </a:prstGeom>
+                  <a:solidFill>
+                    <a:schemeClr val="accent4">
+                      <a:lumMod val="40%"/>
+                      <a:lumOff val="60%"/>
+                    </a:schemeClr>
+                  </a:solidFill>
+                  <a:ln>
+                    <a:solidFill>
+                      <a:schemeClr val="tx1"/>
+                    </a:solidFill>
+                  </a:ln>
+                </p:spPr>
+                <p:style>
+                  <a:lnRef idx="2">
+                    <a:schemeClr val="accent1">
+                      <a:shade val="50%"/>
+                    </a:schemeClr>
+                  </a:lnRef>
+                  <a:fillRef idx="1">
+                    <a:schemeClr val="accent1"/>
+                  </a:fillRef>
+                  <a:effectRef idx="0">
+                    <a:schemeClr val="accent1"/>
+                  </a:effectRef>
+                  <a:fontRef idx="minor">
+                    <a:schemeClr val="lt1"/>
+                  </a:fontRef>
+                </p:style>
+                <p:txBody>
+                  <a:bodyPr rtlCol="0" anchor="ctr"/>
+                  <a:lstStyle/>
+                  <a:p>
+                    <a:pPr algn="ctr"/>
+                    <a:r>
+                      <a:rPr lang="it-IT" sz="1400" dirty="0" err="1">
+                        <a:solidFill>
+                          <a:schemeClr val="tx1"/>
+                        </a:solidFill>
+                      </a:rPr>
+                      <a:t>ConsoleGui</a:t>
+                    </a:r>
+                    <a:endParaRPr lang="it-IT" sz="1400" dirty="0">
+                      <a:solidFill>
+                        <a:schemeClr val="tx1"/>
+                      </a:solidFill>
+                    </a:endParaRPr>
+                  </a:p>
+                </p:txBody>
+              </p:sp>
+              <p:sp>
+                <p:nvSpPr>
+                  <p:cNvPr id="7" name="Rettangolo con angoli arrotondati 6">
+                    <a:extLst>
+                      <a:ext uri="{FF2B5EF4-FFF2-40B4-BE49-F238E27FC236}">
+                        <a16:creationId xmlns:a16="http://schemas.microsoft.com/office/drawing/2014/main" id="{4DE7324D-D696-4FEB-8FCB-AD7C40D6D26D}"/>
+                      </a:ext>
+                    </a:extLst>
+                  </p:cNvPr>
+                  <p:cNvSpPr/>
+                  <p:nvPr/>
+                </p:nvSpPr>
+                <p:spPr>
+                  <a:xfrm>
+                    <a:off x="8386632" y="1596738"/>
+                    <a:ext cx="1634836" cy="397163"/>
+                  </a:xfrm>
+                  <a:prstGeom prst="roundRect">
+                    <a:avLst/>
+                  </a:prstGeom>
+                  <a:solidFill>
+                    <a:schemeClr val="accent4">
+                      <a:lumMod val="40%"/>
+                      <a:lumOff val="60%"/>
+                    </a:schemeClr>
+                  </a:solidFill>
+                  <a:ln>
+                    <a:solidFill>
+                      <a:schemeClr val="tx1"/>
+                    </a:solidFill>
+                  </a:ln>
+                </p:spPr>
+                <p:style>
+                  <a:lnRef idx="2">
+                    <a:schemeClr val="accent1">
+                      <a:shade val="50%"/>
+                    </a:schemeClr>
+                  </a:lnRef>
+                  <a:fillRef idx="1">
+                    <a:schemeClr val="accent1"/>
+                  </a:fillRef>
+                  <a:effectRef idx="0">
+                    <a:schemeClr val="accent1"/>
+                  </a:effectRef>
+                  <a:fontRef idx="minor">
+                    <a:schemeClr val="lt1"/>
+                  </a:fontRef>
+                </p:style>
+                <p:txBody>
+                  <a:bodyPr rtlCol="0" anchor="ctr"/>
+                  <a:lstStyle/>
+                  <a:p>
+                    <a:pPr algn="ctr"/>
+                    <a:r>
+                      <a:rPr lang="it-IT" sz="1400" dirty="0">
+                        <a:solidFill>
+                          <a:schemeClr val="tx1"/>
+                        </a:solidFill>
+                      </a:rPr>
+                      <a:t>Observer</a:t>
+                    </a:r>
+                  </a:p>
+                </p:txBody>
+              </p:sp>
+              <p:sp>
+                <p:nvSpPr>
+                  <p:cNvPr id="8" name="Rettangolo con angoli arrotondati 7">
+                    <a:extLst>
+                      <a:ext uri="{FF2B5EF4-FFF2-40B4-BE49-F238E27FC236}">
+                        <a16:creationId xmlns:a16="http://schemas.microsoft.com/office/drawing/2014/main" id="{EFCA9A7B-5AAA-4F7A-9954-D969F888DF0C}"/>
+                      </a:ext>
+                    </a:extLst>
+                  </p:cNvPr>
+                  <p:cNvSpPr/>
+                  <p:nvPr/>
+                </p:nvSpPr>
+                <p:spPr>
+                  <a:xfrm>
+                    <a:off x="5212014" y="2909453"/>
+                    <a:ext cx="2568071" cy="397163"/>
+                  </a:xfrm>
+                  <a:prstGeom prst="roundRect">
+                    <a:avLst/>
+                  </a:prstGeom>
+                  <a:solidFill>
+                    <a:schemeClr val="accent4">
+                      <a:lumMod val="40%"/>
+                      <a:lumOff val="60%"/>
+                    </a:schemeClr>
+                  </a:solidFill>
+                  <a:ln>
+                    <a:solidFill>
+                      <a:schemeClr val="tx1"/>
+                    </a:solidFill>
+                  </a:ln>
+                </p:spPr>
+                <p:style>
+                  <a:lnRef idx="2">
+                    <a:schemeClr val="accent1">
+                      <a:shade val="50%"/>
+                    </a:schemeClr>
+                  </a:lnRef>
+                  <a:fillRef idx="1">
+                    <a:schemeClr val="accent1"/>
+                  </a:fillRef>
+                  <a:effectRef idx="0">
+                    <a:schemeClr val="accent1"/>
+                  </a:effectRef>
+                  <a:fontRef idx="minor">
+                    <a:schemeClr val="lt1"/>
+                  </a:fontRef>
+                </p:style>
+                <p:txBody>
+                  <a:bodyPr rtlCol="0" anchor="ctr"/>
+                  <a:lstStyle/>
+                  <a:p>
+                    <a:pPr algn="ctr"/>
+                    <a:r>
+                      <a:rPr lang="it-IT" sz="1400" dirty="0" err="1">
+                        <a:solidFill>
+                          <a:schemeClr val="tx1"/>
+                        </a:solidFill>
+                      </a:rPr>
+                      <a:t>RobotInputController</a:t>
+                    </a:r>
+                    <a:endParaRPr lang="it-IT" sz="1400" dirty="0">
+                      <a:solidFill>
+                        <a:schemeClr val="tx1"/>
+                      </a:solidFill>
+                    </a:endParaRPr>
+                  </a:p>
+                </p:txBody>
+              </p:sp>
+              <p:sp>
+                <p:nvSpPr>
+                  <p:cNvPr id="9" name="Rettangolo con angoli arrotondati 8">
+                    <a:extLst>
+                      <a:ext uri="{FF2B5EF4-FFF2-40B4-BE49-F238E27FC236}">
+                        <a16:creationId xmlns:a16="http://schemas.microsoft.com/office/drawing/2014/main" id="{31232ACB-45FF-4ED2-B7C5-6FB67DD19E2D}"/>
+                      </a:ext>
+                    </a:extLst>
+                  </p:cNvPr>
+                  <p:cNvSpPr/>
+                  <p:nvPr/>
+                </p:nvSpPr>
+                <p:spPr>
+                  <a:xfrm>
+                    <a:off x="5212013" y="1613557"/>
+                    <a:ext cx="2568071" cy="397163"/>
+                  </a:xfrm>
+                  <a:prstGeom prst="roundRect">
+                    <a:avLst/>
+                  </a:prstGeom>
+                  <a:solidFill>
+                    <a:schemeClr val="accent4">
+                      <a:lumMod val="40%"/>
+                      <a:lumOff val="60%"/>
+                    </a:schemeClr>
+                  </a:solidFill>
+                  <a:ln>
+                    <a:solidFill>
+                      <a:schemeClr val="tx1"/>
+                    </a:solidFill>
+                  </a:ln>
+                </p:spPr>
+                <p:style>
+                  <a:lnRef idx="2">
+                    <a:schemeClr val="accent1">
+                      <a:shade val="50%"/>
+                    </a:schemeClr>
+                  </a:lnRef>
+                  <a:fillRef idx="1">
+                    <a:schemeClr val="accent1"/>
+                  </a:fillRef>
+                  <a:effectRef idx="0">
+                    <a:schemeClr val="accent1"/>
+                  </a:effectRef>
+                  <a:fontRef idx="minor">
+                    <a:schemeClr val="lt1"/>
+                  </a:fontRef>
+                </p:style>
+                <p:txBody>
+                  <a:bodyPr rtlCol="0" anchor="ctr"/>
+                  <a:lstStyle/>
+                  <a:p>
+                    <a:pPr algn="ctr"/>
+                    <a:r>
+                      <a:rPr lang="it-IT" sz="1400" dirty="0" err="1">
+                        <a:solidFill>
+                          <a:schemeClr val="tx1"/>
+                        </a:solidFill>
+                      </a:rPr>
+                      <a:t>ApplicationLayer</a:t>
+                    </a:r>
+                    <a:endParaRPr lang="it-IT" sz="1400" dirty="0">
+                      <a:solidFill>
+                        <a:schemeClr val="tx1"/>
+                      </a:solidFill>
+                    </a:endParaRPr>
+                  </a:p>
+                </p:txBody>
+              </p:sp>
+              <p:sp>
+                <p:nvSpPr>
+                  <p:cNvPr id="10" name="Rettangolo con angoli arrotondati 9">
+                    <a:extLst>
+                      <a:ext uri="{FF2B5EF4-FFF2-40B4-BE49-F238E27FC236}">
+                        <a16:creationId xmlns:a16="http://schemas.microsoft.com/office/drawing/2014/main" id="{2C88D8DE-6640-4FA1-818E-400502DD3A2B}"/>
+                      </a:ext>
+                    </a:extLst>
+                  </p:cNvPr>
+                  <p:cNvSpPr/>
+                  <p:nvPr/>
+                </p:nvSpPr>
+                <p:spPr>
+                  <a:xfrm>
+                    <a:off x="4861214" y="4761345"/>
+                    <a:ext cx="1634836" cy="397163"/>
+                  </a:xfrm>
+                  <a:prstGeom prst="roundRect">
+                    <a:avLst/>
+                  </a:prstGeom>
+                  <a:solidFill>
+                    <a:schemeClr val="accent4">
+                      <a:lumMod val="40%"/>
+                      <a:lumOff val="60%"/>
+                    </a:schemeClr>
+                  </a:solidFill>
+                  <a:ln>
+                    <a:solidFill>
+                      <a:schemeClr val="tx1"/>
+                    </a:solidFill>
+                  </a:ln>
+                </p:spPr>
+                <p:style>
+                  <a:lnRef idx="2">
+                    <a:schemeClr val="accent1">
+                      <a:shade val="50%"/>
+                    </a:schemeClr>
+                  </a:lnRef>
+                  <a:fillRef idx="1">
+                    <a:schemeClr val="accent1"/>
+                  </a:fillRef>
+                  <a:effectRef idx="0">
+                    <a:schemeClr val="accent1"/>
+                  </a:effectRef>
+                  <a:fontRef idx="minor">
+                    <a:schemeClr val="lt1"/>
+                  </a:fontRef>
+                </p:style>
+                <p:txBody>
+                  <a:bodyPr rtlCol="0" anchor="ctr"/>
+                  <a:lstStyle/>
+                  <a:p>
+                    <a:pPr algn="ctr"/>
+                    <a:r>
+                      <a:rPr lang="it-IT" sz="1400" dirty="0" err="1">
+                        <a:solidFill>
+                          <a:schemeClr val="tx1"/>
+                        </a:solidFill>
+                      </a:rPr>
+                      <a:t>IssHttpSupport</a:t>
+                    </a:r>
+                    <a:endParaRPr lang="it-IT" sz="1400" dirty="0">
+                      <a:solidFill>
+                        <a:schemeClr val="tx1"/>
+                      </a:solidFill>
+                    </a:endParaRPr>
+                  </a:p>
+                </p:txBody>
+              </p:sp>
+              <p:sp>
+                <p:nvSpPr>
+                  <p:cNvPr id="11" name="Rettangolo con angoli arrotondati 10">
+                    <a:extLst>
+                      <a:ext uri="{FF2B5EF4-FFF2-40B4-BE49-F238E27FC236}">
+                        <a16:creationId xmlns:a16="http://schemas.microsoft.com/office/drawing/2014/main" id="{C8E59A16-548E-4361-9BCF-30B6F1CB89F4}"/>
+                      </a:ext>
+                    </a:extLst>
+                  </p:cNvPr>
+                  <p:cNvSpPr/>
+                  <p:nvPr/>
+                </p:nvSpPr>
+                <p:spPr>
+                  <a:xfrm>
+                    <a:off x="6510770" y="4765963"/>
+                    <a:ext cx="1634836" cy="397163"/>
+                  </a:xfrm>
+                  <a:prstGeom prst="roundRect">
+                    <a:avLst/>
+                  </a:prstGeom>
+                  <a:solidFill>
+                    <a:schemeClr val="accent4">
+                      <a:lumMod val="40%"/>
+                      <a:lumOff val="60%"/>
+                    </a:schemeClr>
+                  </a:solidFill>
+                  <a:ln>
+                    <a:solidFill>
+                      <a:schemeClr val="tx1"/>
+                    </a:solidFill>
+                  </a:ln>
+                </p:spPr>
+                <p:style>
+                  <a:lnRef idx="2">
+                    <a:schemeClr val="accent1">
+                      <a:shade val="50%"/>
+                    </a:schemeClr>
+                  </a:lnRef>
+                  <a:fillRef idx="1">
+                    <a:schemeClr val="accent1"/>
+                  </a:fillRef>
+                  <a:effectRef idx="0">
+                    <a:schemeClr val="accent1"/>
+                  </a:effectRef>
+                  <a:fontRef idx="minor">
+                    <a:schemeClr val="lt1"/>
+                  </a:fontRef>
+                </p:style>
+                <p:txBody>
+                  <a:bodyPr rtlCol="0" anchor="ctr"/>
+                  <a:lstStyle/>
+                  <a:p>
+                    <a:pPr algn="ctr"/>
+                    <a:r>
+                      <a:rPr lang="it-IT" sz="1400" dirty="0" err="1">
+                        <a:solidFill>
+                          <a:schemeClr val="tx1"/>
+                        </a:solidFill>
+                      </a:rPr>
+                      <a:t>IssWsSupport</a:t>
+                    </a:r>
+                    <a:endParaRPr lang="it-IT" sz="1400" dirty="0">
+                      <a:solidFill>
+                        <a:schemeClr val="tx1"/>
+                      </a:solidFill>
+                    </a:endParaRPr>
+                  </a:p>
+                </p:txBody>
+              </p:sp>
+              <p:sp>
+                <p:nvSpPr>
+                  <p:cNvPr id="12" name="Rettangolo con angoli arrotondati 11">
+                    <a:extLst>
+                      <a:ext uri="{FF2B5EF4-FFF2-40B4-BE49-F238E27FC236}">
+                        <a16:creationId xmlns:a16="http://schemas.microsoft.com/office/drawing/2014/main" id="{82B6B8CD-F576-4DF6-912F-D663DDD0DFAC}"/>
+                      </a:ext>
+                    </a:extLst>
+                  </p:cNvPr>
+                  <p:cNvSpPr/>
+                  <p:nvPr/>
+                </p:nvSpPr>
+                <p:spPr>
+                  <a:xfrm>
+                    <a:off x="4861214" y="4359564"/>
+                    <a:ext cx="3284392" cy="397163"/>
+                  </a:xfrm>
+                  <a:prstGeom prst="roundRect">
+                    <a:avLst/>
+                  </a:prstGeom>
+                  <a:solidFill>
+                    <a:srgbClr val="9AE187"/>
+                  </a:solidFill>
+                  <a:ln>
+                    <a:solidFill>
+                      <a:schemeClr val="tx1"/>
+                    </a:solidFill>
+                  </a:ln>
+                </p:spPr>
+                <p:style>
+                  <a:lnRef idx="2">
+                    <a:schemeClr val="accent1">
+                      <a:shade val="50%"/>
+                    </a:schemeClr>
+                  </a:lnRef>
+                  <a:fillRef idx="1">
+                    <a:schemeClr val="accent1"/>
+                  </a:fillRef>
+                  <a:effectRef idx="0">
+                    <a:schemeClr val="accent1"/>
+                  </a:effectRef>
+                  <a:fontRef idx="minor">
+                    <a:schemeClr val="lt1"/>
+                  </a:fontRef>
+                </p:style>
+                <p:txBody>
+                  <a:bodyPr rtlCol="0" anchor="ctr"/>
+                  <a:lstStyle/>
+                  <a:p>
+                    <a:pPr algn="ctr"/>
+                    <a:r>
+                      <a:rPr lang="it-IT" sz="1400" dirty="0" err="1">
+                        <a:solidFill>
+                          <a:schemeClr val="tx1"/>
+                        </a:solidFill>
+                      </a:rPr>
+                      <a:t>IssOperations</a:t>
+                    </a:r>
+                    <a:endParaRPr lang="it-IT" sz="1400" dirty="0">
+                      <a:solidFill>
+                        <a:schemeClr val="tx1"/>
+                      </a:solidFill>
+                    </a:endParaRPr>
+                  </a:p>
+                </p:txBody>
+              </p:sp>
+              <p:sp>
+                <p:nvSpPr>
+                  <p:cNvPr id="13" name="Rettangolo con angoli arrotondati 12">
+                    <a:extLst>
+                      <a:ext uri="{FF2B5EF4-FFF2-40B4-BE49-F238E27FC236}">
+                        <a16:creationId xmlns:a16="http://schemas.microsoft.com/office/drawing/2014/main" id="{65F4B05E-EE2A-43AB-81D2-676E1EFF17A0}"/>
+                      </a:ext>
+                    </a:extLst>
+                  </p:cNvPr>
+                  <p:cNvSpPr/>
+                  <p:nvPr/>
+                </p:nvSpPr>
+                <p:spPr>
+                  <a:xfrm>
+                    <a:off x="4853854" y="3948547"/>
+                    <a:ext cx="3284392" cy="397163"/>
+                  </a:xfrm>
+                  <a:prstGeom prst="roundRect">
+                    <a:avLst/>
+                  </a:prstGeom>
+                  <a:solidFill>
+                    <a:srgbClr val="9AE187"/>
+                  </a:solidFill>
+                  <a:ln>
+                    <a:solidFill>
+                      <a:schemeClr val="tx1"/>
+                    </a:solidFill>
+                  </a:ln>
+                </p:spPr>
+                <p:style>
+                  <a:lnRef idx="2">
+                    <a:schemeClr val="accent1">
+                      <a:shade val="50%"/>
+                    </a:schemeClr>
+                  </a:lnRef>
+                  <a:fillRef idx="1">
+                    <a:schemeClr val="accent1"/>
+                  </a:fillRef>
+                  <a:effectRef idx="0">
+                    <a:schemeClr val="accent1"/>
+                  </a:effectRef>
+                  <a:fontRef idx="minor">
+                    <a:schemeClr val="lt1"/>
+                  </a:fontRef>
+                </p:style>
+                <p:txBody>
+                  <a:bodyPr rtlCol="0" anchor="ctr"/>
+                  <a:lstStyle/>
+                  <a:p>
+                    <a:pPr algn="ctr"/>
+                    <a:r>
+                      <a:rPr lang="it-IT" sz="1400" dirty="0" err="1">
+                        <a:solidFill>
+                          <a:schemeClr val="tx1"/>
+                        </a:solidFill>
+                      </a:rPr>
+                      <a:t>IssCommSupport</a:t>
+                    </a:r>
+                    <a:endParaRPr lang="it-IT" sz="1400" dirty="0">
+                      <a:solidFill>
+                        <a:schemeClr val="tx1"/>
+                      </a:solidFill>
+                    </a:endParaRPr>
+                  </a:p>
+                </p:txBody>
+              </p:sp>
+              <p:sp>
+                <p:nvSpPr>
+                  <p:cNvPr id="14" name="Rettangolo con angoli arrotondati 13">
+                    <a:extLst>
+                      <a:ext uri="{FF2B5EF4-FFF2-40B4-BE49-F238E27FC236}">
+                        <a16:creationId xmlns:a16="http://schemas.microsoft.com/office/drawing/2014/main" id="{BC2AF1E7-6E64-41AE-95E5-30743D7F7720}"/>
+                      </a:ext>
+                    </a:extLst>
+                  </p:cNvPr>
+                  <p:cNvSpPr/>
+                  <p:nvPr/>
+                </p:nvSpPr>
+                <p:spPr>
+                  <a:xfrm>
+                    <a:off x="5212014" y="2491510"/>
+                    <a:ext cx="2568071" cy="397163"/>
+                  </a:xfrm>
+                  <a:prstGeom prst="roundRect">
+                    <a:avLst/>
+                  </a:prstGeom>
+                  <a:solidFill>
+                    <a:srgbClr val="9AE187"/>
+                  </a:solidFill>
+                  <a:ln>
+                    <a:solidFill>
+                      <a:schemeClr val="tx1"/>
+                    </a:solidFill>
+                  </a:ln>
+                </p:spPr>
+                <p:style>
+                  <a:lnRef idx="2">
+                    <a:schemeClr val="accent1">
+                      <a:shade val="50%"/>
+                    </a:schemeClr>
+                  </a:lnRef>
+                  <a:fillRef idx="1">
+                    <a:schemeClr val="accent1"/>
+                  </a:fillRef>
+                  <a:effectRef idx="0">
+                    <a:schemeClr val="accent1"/>
+                  </a:effectRef>
+                  <a:fontRef idx="minor">
+                    <a:schemeClr val="lt1"/>
+                  </a:fontRef>
+                </p:style>
+                <p:txBody>
+                  <a:bodyPr rtlCol="0" anchor="ctr"/>
+                  <a:lstStyle/>
+                  <a:p>
+                    <a:pPr algn="ctr"/>
+                    <a:r>
+                      <a:rPr lang="it-IT" sz="1400" dirty="0" err="1">
+                        <a:solidFill>
+                          <a:schemeClr val="tx1"/>
+                        </a:solidFill>
+                      </a:rPr>
+                      <a:t>IssObserver</a:t>
+                    </a:r>
+                    <a:endParaRPr lang="it-IT" sz="1400" dirty="0">
+                      <a:solidFill>
+                        <a:schemeClr val="tx1"/>
+                      </a:solidFill>
+                    </a:endParaRPr>
+                  </a:p>
+                </p:txBody>
+              </p:sp>
+              <p:cxnSp>
+                <p:nvCxnSpPr>
+                  <p:cNvPr id="15" name="Connettore 2 14">
+                    <a:extLst>
+                      <a:ext uri="{FF2B5EF4-FFF2-40B4-BE49-F238E27FC236}">
+                        <a16:creationId xmlns:a16="http://schemas.microsoft.com/office/drawing/2014/main" id="{51123968-1026-42C1-B81C-603F0E62686F}"/>
+                      </a:ext>
+                    </a:extLst>
+                  </p:cNvPr>
+                  <p:cNvCxnSpPr>
+                    <a:stCxn id="5" idx="0"/>
+                    <a:endCxn id="3" idx="2"/>
+                  </p:cNvCxnSpPr>
+                  <p:nvPr/>
+                </p:nvCxnSpPr>
+                <p:spPr>
+                  <a:xfrm flipH="1" flipV="1">
+                    <a:off x="3014025" y="2491510"/>
+                    <a:ext cx="1" cy="417943"/>
+                  </a:xfrm>
+                  <a:prstGeom prst="straightConnector1">
+                    <a:avLst/>
+                  </a:prstGeom>
+                  <a:ln>
+                    <a:tailEnd type="triangle"/>
+                  </a:ln>
+                </p:spPr>
+                <p:style>
+                  <a:lnRef idx="1">
+                    <a:schemeClr val="accent1"/>
+                  </a:lnRef>
+                  <a:fillRef idx="0">
+                    <a:schemeClr val="accent1"/>
+                  </a:fillRef>
+                  <a:effectRef idx="0">
+                    <a:schemeClr val="accent1"/>
+                  </a:effectRef>
+                  <a:fontRef idx="minor">
+                    <a:schemeClr val="tx1"/>
+                  </a:fontRef>
+                </p:style>
+              </p:cxnSp>
+              <p:cxnSp>
+                <p:nvCxnSpPr>
+                  <p:cNvPr id="19" name="Connettore a gomito 18">
+                    <a:extLst>
+                      <a:ext uri="{FF2B5EF4-FFF2-40B4-BE49-F238E27FC236}">
+                        <a16:creationId xmlns:a16="http://schemas.microsoft.com/office/drawing/2014/main" id="{A359633E-471A-4476-8780-9709B21201C0}"/>
+                      </a:ext>
+                    </a:extLst>
+                  </p:cNvPr>
+                  <p:cNvCxnSpPr>
+                    <a:cxnSpLocks/>
+                    <a:stCxn id="5" idx="2"/>
+                    <a:endCxn id="13" idx="1"/>
+                  </p:cNvCxnSpPr>
+                  <p:nvPr/>
+                </p:nvCxnSpPr>
+                <p:spPr>
+                  <a:xfrm rot="16200000" flipH="1">
+                    <a:off x="3513684" y="2806958"/>
+                    <a:ext cx="840513" cy="1839828"/>
+                  </a:xfrm>
+                  <a:prstGeom prst="bentConnector2">
+                    <a:avLst/>
+                  </a:prstGeom>
+                  <a:ln>
+                    <a:tailEnd type="triangle"/>
+                  </a:ln>
+                </p:spPr>
+                <p:style>
+                  <a:lnRef idx="1">
+                    <a:schemeClr val="accent1"/>
+                  </a:lnRef>
+                  <a:fillRef idx="0">
+                    <a:schemeClr val="accent1"/>
+                  </a:fillRef>
+                  <a:effectRef idx="0">
+                    <a:schemeClr val="accent1"/>
+                  </a:effectRef>
+                  <a:fontRef idx="minor">
+                    <a:schemeClr val="tx1"/>
+                  </a:fontRef>
+                </p:style>
+              </p:cxnSp>
+              <p:cxnSp>
+                <p:nvCxnSpPr>
+                  <p:cNvPr id="22" name="Connettore a gomito 21">
+                    <a:extLst>
+                      <a:ext uri="{FF2B5EF4-FFF2-40B4-BE49-F238E27FC236}">
+                        <a16:creationId xmlns:a16="http://schemas.microsoft.com/office/drawing/2014/main" id="{379DE2A5-8423-41A3-B1A7-A9D9BAED8CDD}"/>
+                      </a:ext>
+                    </a:extLst>
+                  </p:cNvPr>
+                  <p:cNvCxnSpPr>
+                    <a:cxnSpLocks/>
+                    <a:stCxn id="11" idx="3"/>
+                    <a:endCxn id="8" idx="3"/>
+                  </p:cNvCxnSpPr>
+                  <p:nvPr/>
+                </p:nvCxnSpPr>
+                <p:spPr>
+                  <a:xfrm flipH="1" flipV="1">
+                    <a:off x="7780085" y="3108035"/>
+                    <a:ext cx="365521" cy="1856510"/>
+                  </a:xfrm>
+                  <a:prstGeom prst="bentConnector3">
+                    <a:avLst>
+                      <a:gd name="adj1" fmla="val -62541"/>
+                    </a:avLst>
+                  </a:prstGeom>
+                  <a:ln>
+                    <a:tailEnd type="triangle"/>
+                  </a:ln>
+                </p:spPr>
+                <p:style>
+                  <a:lnRef idx="1">
+                    <a:schemeClr val="accent1"/>
+                  </a:lnRef>
+                  <a:fillRef idx="0">
+                    <a:schemeClr val="accent1"/>
+                  </a:fillRef>
+                  <a:effectRef idx="0">
+                    <a:schemeClr val="accent1"/>
+                  </a:effectRef>
+                  <a:fontRef idx="minor">
+                    <a:schemeClr val="tx1"/>
+                  </a:fontRef>
+                </p:style>
+              </p:cxnSp>
+              <p:cxnSp>
+                <p:nvCxnSpPr>
+                  <p:cNvPr id="24" name="Connettore 2 23">
+                    <a:extLst>
+                      <a:ext uri="{FF2B5EF4-FFF2-40B4-BE49-F238E27FC236}">
+                        <a16:creationId xmlns:a16="http://schemas.microsoft.com/office/drawing/2014/main" id="{F83AF61D-B247-4416-BD42-618322409149}"/>
+                      </a:ext>
+                    </a:extLst>
+                  </p:cNvPr>
+                  <p:cNvCxnSpPr>
+                    <a:cxnSpLocks/>
+                  </p:cNvCxnSpPr>
+                  <p:nvPr/>
+                </p:nvCxnSpPr>
+                <p:spPr>
+                  <a:xfrm flipH="1">
+                    <a:off x="7780085" y="2548418"/>
+                    <a:ext cx="606547" cy="512392"/>
+                  </a:xfrm>
+                  <a:prstGeom prst="straightConnector1">
+                    <a:avLst/>
+                  </a:prstGeom>
+                  <a:ln>
+                    <a:tailEnd type="triangle"/>
+                  </a:ln>
+                </p:spPr>
+                <p:style>
+                  <a:lnRef idx="1">
+                    <a:schemeClr val="accent1"/>
+                  </a:lnRef>
+                  <a:fillRef idx="0">
+                    <a:schemeClr val="accent1"/>
+                  </a:fillRef>
+                  <a:effectRef idx="0">
+                    <a:schemeClr val="accent1"/>
+                  </a:effectRef>
+                  <a:fontRef idx="minor">
+                    <a:schemeClr val="tx1"/>
+                  </a:fontRef>
+                </p:style>
+              </p:cxnSp>
+              <p:sp>
+                <p:nvSpPr>
+                  <p:cNvPr id="26" name="Triangolo isoscele 25">
+                    <a:extLst>
+                      <a:ext uri="{FF2B5EF4-FFF2-40B4-BE49-F238E27FC236}">
+                        <a16:creationId xmlns:a16="http://schemas.microsoft.com/office/drawing/2014/main" id="{52B72DD5-7ED7-48F4-9794-C0F6B86D544E}"/>
+                      </a:ext>
+                    </a:extLst>
+                  </p:cNvPr>
+                  <p:cNvSpPr/>
+                  <p:nvPr/>
+                </p:nvSpPr>
+                <p:spPr>
+                  <a:xfrm>
+                    <a:off x="9142137" y="2021199"/>
+                    <a:ext cx="123825" cy="100446"/>
+                  </a:xfrm>
+                  <a:prstGeom prst="triangle">
+                    <a:avLst/>
+                  </a:prstGeom>
+                  <a:solidFill>
+                    <a:schemeClr val="bg1"/>
+                  </a:solidFill>
+                </p:spPr>
+                <p:style>
+                  <a:lnRef idx="2">
+                    <a:schemeClr val="accent1">
+                      <a:shade val="50%"/>
+                    </a:schemeClr>
+                  </a:lnRef>
+                  <a:fillRef idx="1">
+                    <a:schemeClr val="accent1"/>
+                  </a:fillRef>
+                  <a:effectRef idx="0">
+                    <a:schemeClr val="accent1"/>
+                  </a:effectRef>
+                  <a:fontRef idx="minor">
+                    <a:schemeClr val="lt1"/>
+                  </a:fontRef>
+                </p:style>
+                <p:txBody>
+                  <a:bodyPr rtlCol="0" anchor="ctr"/>
+                  <a:lstStyle/>
+                  <a:p>
+                    <a:pPr algn="ctr"/>
+                    <a:endParaRPr lang="it-IT"/>
+                  </a:p>
+                </p:txBody>
+              </p:sp>
+              <p:cxnSp>
+                <p:nvCxnSpPr>
+                  <p:cNvPr id="28" name="Connettore diritto 27">
+                    <a:extLst>
+                      <a:ext uri="{FF2B5EF4-FFF2-40B4-BE49-F238E27FC236}">
+                        <a16:creationId xmlns:a16="http://schemas.microsoft.com/office/drawing/2014/main" id="{9DC14D0F-D10B-4995-BAF8-3AA848088829}"/>
+                      </a:ext>
+                    </a:extLst>
+                  </p:cNvPr>
+                  <p:cNvCxnSpPr>
+                    <a:stCxn id="26" idx="3"/>
+                    <a:endCxn id="6" idx="0"/>
+                  </p:cNvCxnSpPr>
+                  <p:nvPr/>
+                </p:nvCxnSpPr>
+                <p:spPr>
+                  <a:xfrm>
+                    <a:off x="9204050" y="2121645"/>
+                    <a:ext cx="0" cy="228191"/>
+                  </a:xfrm>
+                  <a:prstGeom prst="line">
+                    <a:avLst/>
+                  </a:prstGeom>
+                  <a:ln>
+                    <a:prstDash val="sysDot"/>
+                  </a:ln>
+                </p:spPr>
+                <p:style>
+                  <a:lnRef idx="1">
+                    <a:schemeClr val="accent1"/>
+                  </a:lnRef>
+                  <a:fillRef idx="0">
+                    <a:schemeClr val="accent1"/>
+                  </a:fillRef>
+                  <a:effectRef idx="0">
+                    <a:schemeClr val="accent1"/>
+                  </a:effectRef>
+                  <a:fontRef idx="minor">
+                    <a:schemeClr val="tx1"/>
+                  </a:fontRef>
+                </p:style>
+              </p:cxnSp>
+              <p:cxnSp>
+                <p:nvCxnSpPr>
+                  <p:cNvPr id="31" name="Connettore 2 30">
+                    <a:extLst>
+                      <a:ext uri="{FF2B5EF4-FFF2-40B4-BE49-F238E27FC236}">
+                        <a16:creationId xmlns:a16="http://schemas.microsoft.com/office/drawing/2014/main" id="{4503135C-3C64-48E6-8E3D-A6A25FA5689C}"/>
+                      </a:ext>
+                    </a:extLst>
+                  </p:cNvPr>
+                  <p:cNvCxnSpPr>
+                    <a:stCxn id="8" idx="1"/>
+                    <a:endCxn id="5" idx="3"/>
+                  </p:cNvCxnSpPr>
+                  <p:nvPr/>
+                </p:nvCxnSpPr>
+                <p:spPr>
+                  <a:xfrm flipH="1">
+                    <a:off x="4298061" y="3108035"/>
+                    <a:ext cx="913953" cy="0"/>
+                  </a:xfrm>
+                  <a:prstGeom prst="straightConnector1">
+                    <a:avLst/>
+                  </a:prstGeom>
+                  <a:ln>
+                    <a:tailEnd type="triangle"/>
+                  </a:ln>
+                </p:spPr>
+                <p:style>
+                  <a:lnRef idx="1">
+                    <a:schemeClr val="accent1"/>
+                  </a:lnRef>
+                  <a:fillRef idx="0">
+                    <a:schemeClr val="accent1"/>
+                  </a:fillRef>
+                  <a:effectRef idx="0">
+                    <a:schemeClr val="accent1"/>
+                  </a:effectRef>
+                  <a:fontRef idx="minor">
+                    <a:schemeClr val="tx1"/>
+                  </a:fontRef>
+                </p:style>
+              </p:cxnSp>
+              <p:cxnSp>
+                <p:nvCxnSpPr>
+                  <p:cNvPr id="1025" name="Connettore 2 1024">
+                    <a:extLst>
+                      <a:ext uri="{FF2B5EF4-FFF2-40B4-BE49-F238E27FC236}">
+                        <a16:creationId xmlns:a16="http://schemas.microsoft.com/office/drawing/2014/main" id="{61D5EF5A-4D96-4606-8B26-BF923776AA0B}"/>
+                      </a:ext>
+                    </a:extLst>
+                  </p:cNvPr>
+                  <p:cNvCxnSpPr/>
+                  <p:nvPr/>
+                </p:nvCxnSpPr>
+                <p:spPr>
+                  <a:xfrm>
+                    <a:off x="4755037" y="1348033"/>
+                    <a:ext cx="0" cy="887707"/>
+                  </a:xfrm>
+                  <a:prstGeom prst="straightConnector1">
+                    <a:avLst/>
+                  </a:prstGeom>
+                  <a:ln w="38100">
+                    <a:solidFill>
+                      <a:srgbClr val="C00000"/>
+                    </a:solidFill>
+                    <a:tailEnd type="triangle"/>
+                  </a:ln>
+                </p:spPr>
+                <p:style>
+                  <a:lnRef idx="1">
+                    <a:schemeClr val="accent1"/>
+                  </a:lnRef>
+                  <a:fillRef idx="0">
+                    <a:schemeClr val="accent1"/>
+                  </a:fillRef>
+                  <a:effectRef idx="0">
+                    <a:schemeClr val="accent1"/>
+                  </a:effectRef>
+                  <a:fontRef idx="minor">
+                    <a:schemeClr val="tx1"/>
+                  </a:fontRef>
+                </p:style>
+              </p:cxnSp>
+              <p:cxnSp>
+                <p:nvCxnSpPr>
+                  <p:cNvPr id="35" name="Connettore 2 34">
+                    <a:extLst>
+                      <a:ext uri="{FF2B5EF4-FFF2-40B4-BE49-F238E27FC236}">
+                        <a16:creationId xmlns:a16="http://schemas.microsoft.com/office/drawing/2014/main" id="{3CF860C6-7537-4293-97C2-F93969A44667}"/>
+                      </a:ext>
+                    </a:extLst>
+                  </p:cNvPr>
+                  <p:cNvCxnSpPr/>
+                  <p:nvPr/>
+                </p:nvCxnSpPr>
+                <p:spPr>
+                  <a:xfrm>
+                    <a:off x="3483990" y="4322109"/>
+                    <a:ext cx="0" cy="887707"/>
+                  </a:xfrm>
+                  <a:prstGeom prst="straightConnector1">
+                    <a:avLst/>
+                  </a:prstGeom>
+                  <a:ln w="38100">
+                    <a:solidFill>
+                      <a:srgbClr val="C00000"/>
+                    </a:solidFill>
+                    <a:tailEnd type="triangle"/>
+                  </a:ln>
+                </p:spPr>
+                <p:style>
+                  <a:lnRef idx="1">
+                    <a:schemeClr val="accent1"/>
+                  </a:lnRef>
+                  <a:fillRef idx="0">
+                    <a:schemeClr val="accent1"/>
+                  </a:fillRef>
+                  <a:effectRef idx="0">
+                    <a:schemeClr val="accent1"/>
+                  </a:effectRef>
+                  <a:fontRef idx="minor">
+                    <a:schemeClr val="tx1"/>
+                  </a:fontRef>
+                </p:style>
+              </p:cxnSp>
+              <p:sp>
+                <p:nvSpPr>
+                  <p:cNvPr id="1027" name="CasellaDiTesto 1026">
+                    <a:extLst>
+                      <a:ext uri="{FF2B5EF4-FFF2-40B4-BE49-F238E27FC236}">
+                        <a16:creationId xmlns:a16="http://schemas.microsoft.com/office/drawing/2014/main" id="{16FB3E2D-C44C-4DC9-8C55-A7A2E99B6189}"/>
+                      </a:ext>
+                    </a:extLst>
+                  </p:cNvPr>
+                  <p:cNvSpPr txBox="1"/>
+                  <p:nvPr/>
+                </p:nvSpPr>
+                <p:spPr>
+                  <a:xfrm>
+                    <a:off x="3012466" y="3772954"/>
+                    <a:ext cx="742960" cy="307777"/>
+                  </a:xfrm>
+                  <a:prstGeom prst="rect">
+                    <a:avLst/>
+                  </a:prstGeom>
+                  <a:noFill/>
+                </p:spPr>
+                <p:txBody>
+                  <a:bodyPr wrap="none" rtlCol="0">
+                    <a:spAutoFit/>
+                  </a:bodyPr>
+                  <a:lstStyle/>
+                  <a:p>
+                    <a:r>
+                      <a:rPr lang="it-IT" sz="1400" dirty="0" err="1"/>
+                      <a:t>request</a:t>
+                    </a:r>
+                    <a:endParaRPr lang="it-IT" sz="1400" dirty="0"/>
+                  </a:p>
+                </p:txBody>
+              </p:sp>
+              <p:sp>
+                <p:nvSpPr>
+                  <p:cNvPr id="37" name="CasellaDiTesto 36">
+                    <a:extLst>
+                      <a:ext uri="{FF2B5EF4-FFF2-40B4-BE49-F238E27FC236}">
+                        <a16:creationId xmlns:a16="http://schemas.microsoft.com/office/drawing/2014/main" id="{228EEE49-1EC4-4712-8FE7-126E8667B31C}"/>
+                      </a:ext>
+                    </a:extLst>
+                  </p:cNvPr>
+                  <p:cNvSpPr txBox="1"/>
+                  <p:nvPr/>
+                </p:nvSpPr>
+                <p:spPr>
+                  <a:xfrm>
+                    <a:off x="8399177" y="3882401"/>
+                    <a:ext cx="1371145" cy="307777"/>
+                  </a:xfrm>
+                  <a:prstGeom prst="rect">
+                    <a:avLst/>
+                  </a:prstGeom>
+                  <a:noFill/>
+                </p:spPr>
+                <p:txBody>
+                  <a:bodyPr wrap="none" rtlCol="0">
+                    <a:spAutoFit/>
+                  </a:bodyPr>
+                  <a:lstStyle/>
+                  <a:p>
+                    <a:r>
+                      <a:rPr lang="it-IT" sz="1400" dirty="0" err="1"/>
+                      <a:t>updateObserver</a:t>
+                    </a:r>
+                    <a:endParaRPr lang="it-IT" sz="1400" dirty="0"/>
+                  </a:p>
+                </p:txBody>
+              </p:sp>
+              <p:sp>
+                <p:nvSpPr>
+                  <p:cNvPr id="1031" name="CasellaDiTesto 1030">
+                    <a:extLst>
+                      <a:ext uri="{FF2B5EF4-FFF2-40B4-BE49-F238E27FC236}">
+                        <a16:creationId xmlns:a16="http://schemas.microsoft.com/office/drawing/2014/main" id="{3CF1F699-B5D9-4186-B92B-50B8E3EACCB4}"/>
+                      </a:ext>
+                    </a:extLst>
+                  </p:cNvPr>
+                  <p:cNvSpPr txBox="1"/>
+                  <p:nvPr/>
+                </p:nvSpPr>
+                <p:spPr>
+                  <a:xfrm>
+                    <a:off x="5651647" y="5436098"/>
+                    <a:ext cx="1245021" cy="369332"/>
+                  </a:xfrm>
+                  <a:prstGeom prst="rect">
+                    <a:avLst/>
+                  </a:prstGeom>
+                  <a:solidFill>
+                    <a:schemeClr val="bg1">
+                      <a:lumMod val="95%"/>
+                    </a:schemeClr>
+                  </a:solidFill>
+                </p:spPr>
+                <p:txBody>
+                  <a:bodyPr wrap="none" rtlCol="0">
+                    <a:spAutoFit/>
+                  </a:bodyPr>
+                  <a:lstStyle/>
+                  <a:p>
+                    <a:r>
+                      <a:rPr lang="it-IT" dirty="0"/>
+                      <a:t>Application</a:t>
+                    </a:r>
+                  </a:p>
+                </p:txBody>
+              </p:sp>
+            </p:grpSp>
+            <p:grpSp>
+              <p:nvGrpSpPr>
+                <p:cNvPr id="44" name="Gruppo 43">
+                  <a:extLst>
+                    <a:ext uri="{FF2B5EF4-FFF2-40B4-BE49-F238E27FC236}">
+                      <a16:creationId xmlns:a16="http://schemas.microsoft.com/office/drawing/2014/main" id="{F7810F13-9324-4DE4-8353-AF993536CA54}"/>
+                    </a:ext>
+                  </a:extLst>
+                </p:cNvPr>
+                <p:cNvGrpSpPr/>
+                <p:nvPr/>
+              </p:nvGrpSpPr>
+              <p:grpSpPr>
+                <a:xfrm>
+                  <a:off x="10490851" y="1217173"/>
+                  <a:ext cx="4542595" cy="3761165"/>
+                  <a:chOff x="5607844" y="3744728"/>
+                  <a:chExt cx="2989330" cy="2475097"/>
+                </a:xfrm>
+              </p:grpSpPr>
+              <p:pic>
+                <p:nvPicPr>
+                  <p:cNvPr id="45" name="Picture 2" descr="RobotBoundaryArilZooming">
+                    <a:extLst>
+                      <a:ext uri="{FF2B5EF4-FFF2-40B4-BE49-F238E27FC236}">
+                        <a16:creationId xmlns:a16="http://schemas.microsoft.com/office/drawing/2014/main" id="{3E6E38D8-FEE8-46A8-83BD-EBE4940A8456}"/>
+                      </a:ext>
+                    </a:extLst>
+                  </p:cNvPr>
+                  <p:cNvPicPr>
+                    <a:picLocks noChangeAspect="1" noChangeArrowheads="1"/>
+                  </p:cNvPicPr>
+                  <p:nvPr/>
+                </p:nvPicPr>
+                <p:blipFill rotWithShape="1">
+                  <a:blip r:embed="rId2">
+                    <a:extLst>
+                      <a:ext uri="{28A0092B-C50C-407E-A947-70E740481C1C}">
+                        <a14:useLocalDpi xmlns:a14="http://schemas.microsoft.com/office/drawing/2010/main" val="0"/>
+                      </a:ext>
+                    </a:extLst>
+                  </a:blip>
+                  <a:srcRect l="59.996%" b="5.499%"/>
+                  <a:stretch/>
+                </p:blipFill>
+                <p:spPr bwMode="auto">
+                  <a:xfrm>
+                    <a:off x="5610225" y="3744728"/>
+                    <a:ext cx="2986949" cy="2475097"/>
+                  </a:xfrm>
+                  <a:prstGeom prst="rect">
+                    <a:avLst/>
+                  </a:prstGeom>
+                  <a:noFill/>
+                  <a:extLst>
+                    <a:ext uri="{909E8E84-426E-40DD-AFC4-6F175D3DCCD1}">
+                      <a14:hiddenFill xmlns:a14="http://schemas.microsoft.com/office/drawing/2010/main">
+                        <a:solidFill>
+                          <a:srgbClr val="FFFFFF"/>
+                        </a:solidFill>
+                      </a14:hiddenFill>
+                    </a:ext>
+                  </a:extLst>
+                </p:spPr>
+              </p:pic>
+              <p:sp>
+                <p:nvSpPr>
+                  <p:cNvPr id="46" name="Rettangolo 45">
+                    <a:extLst>
+                      <a:ext uri="{FF2B5EF4-FFF2-40B4-BE49-F238E27FC236}">
+                        <a16:creationId xmlns:a16="http://schemas.microsoft.com/office/drawing/2014/main" id="{D43DDD55-5F4F-4E1D-BDC0-440BDEBCDD01}"/>
+                      </a:ext>
+                    </a:extLst>
+                  </p:cNvPr>
+                  <p:cNvSpPr/>
+                  <p:nvPr/>
+                </p:nvSpPr>
+                <p:spPr>
+                  <a:xfrm>
+                    <a:off x="5607844" y="5281613"/>
+                    <a:ext cx="240507" cy="169068"/>
+                  </a:xfrm>
+                  <a:prstGeom prst="rect">
+                    <a:avLst/>
+                  </a:prstGeom>
+                  <a:solidFill>
+                    <a:schemeClr val="bg1"/>
+                  </a:solidFill>
+                  <a:ln>
+                    <a:solidFill>
+                      <a:schemeClr val="bg1"/>
+                    </a:solidFill>
+                  </a:ln>
+                </p:spPr>
+                <p:style>
+                  <a:lnRef idx="2">
+                    <a:schemeClr val="accent1">
+                      <a:shade val="50%"/>
+                    </a:schemeClr>
+                  </a:lnRef>
+                  <a:fillRef idx="1">
+                    <a:schemeClr val="accent1"/>
+                  </a:fillRef>
+                  <a:effectRef idx="0">
+                    <a:schemeClr val="accent1"/>
+                  </a:effectRef>
+                  <a:fontRef idx="minor">
+                    <a:schemeClr val="lt1"/>
+                  </a:fontRef>
+                </p:style>
+                <p:txBody>
+                  <a:bodyPr rtlCol="0" anchor="ctr"/>
+                  <a:lstStyle/>
+                  <a:p>
+                    <a:pPr algn="ctr"/>
+                    <a:endParaRPr lang="it-IT"/>
+                  </a:p>
+                </p:txBody>
+              </p:sp>
+            </p:grpSp>
+          </p:grpSp>
           <p:sp>
             <p:nvSpPr>
-              <p:cNvPr id="1028" name="Ovale 1027">
+              <p:cNvPr id="2" name="Decisione 1">
                 <a:extLst>
                   <a:ext uri="{FF2B5EF4-FFF2-40B4-BE49-F238E27FC236}">
-                    <a16:creationId xmlns:a16="http://schemas.microsoft.com/office/drawing/2014/main" id="{7286CBFB-BBE1-475D-B9C7-9E7E0B39EF5E}"/>
+                    <a16:creationId xmlns:a16="http://schemas.microsoft.com/office/drawing/2014/main" id="{0C389230-CF06-4BEF-96B9-E5C1683B2AD0}"/>
                   </a:ext>
                 </a:extLst>
               </p:cNvPr>
@@ -14378,38 +15844,29 @@
             </p:nvSpPr>
             <p:spPr>
               <a:xfrm>
-                <a:off x="1466337" y="525591"/>
-                <a:ext cx="9615642" cy="5562047"/>
+                <a:off x="2193807" y="3338134"/>
+                <a:ext cx="454564" cy="255489"/>
               </a:xfrm>
-              <a:prstGeom prst="ellipse">
+              <a:prstGeom prst="flowChartDecision">
                 <a:avLst/>
               </a:prstGeom>
-              <a:solidFill>
-                <a:schemeClr val="accent5">
-                  <a:lumMod val="20%"/>
-                  <a:lumOff val="80%"/>
-                </a:schemeClr>
-              </a:solidFill>
               <a:ln>
                 <a:solidFill>
-                  <a:schemeClr val="accent5">
-                    <a:lumMod val="60%"/>
-                    <a:lumOff val="40%"/>
-                  </a:schemeClr>
+                  <a:schemeClr val="tx1"/>
                 </a:solidFill>
               </a:ln>
             </p:spPr>
             <p:style>
               <a:lnRef idx="2">
-                <a:schemeClr val="accent1">
+                <a:schemeClr val="dk1">
                   <a:shade val="50%"/>
                 </a:schemeClr>
               </a:lnRef>
               <a:fillRef idx="1">
-                <a:schemeClr val="accent1"/>
+                <a:schemeClr val="dk1"/>
               </a:fillRef>
               <a:effectRef idx="0">
-                <a:schemeClr val="accent1"/>
+                <a:schemeClr val="dk1"/>
               </a:effectRef>
               <a:fontRef idx="minor">
                 <a:schemeClr val="lt1"/>
@@ -14420,16 +15877,16 @@
               <a:lstStyle/>
               <a:p>
                 <a:pPr algn="ctr"/>
-                <a:endParaRPr lang="it-IT" dirty="0"/>
+                <a:endParaRPr lang="it-IT"/>
               </a:p>
             </p:txBody>
           </p:sp>
           <p:sp>
             <p:nvSpPr>
-              <p:cNvPr id="3" name="Rettangolo con angoli arrotondati 2">
+              <p:cNvPr id="32" name="Decisione 31">
                 <a:extLst>
                   <a:ext uri="{FF2B5EF4-FFF2-40B4-BE49-F238E27FC236}">
-                    <a16:creationId xmlns:a16="http://schemas.microsoft.com/office/drawing/2014/main" id="{FD32C25D-D9BE-4028-90E5-C27A6FD3273C}"/>
+                    <a16:creationId xmlns:a16="http://schemas.microsoft.com/office/drawing/2014/main" id="{B599C164-D1B8-4C9D-9751-848D568B93AE}"/>
                   </a:ext>
                 </a:extLst>
               </p:cNvPr>
@@ -14438,18 +15895,12 @@
             </p:nvSpPr>
             <p:spPr>
               <a:xfrm>
-                <a:off x="2119474" y="2094347"/>
-                <a:ext cx="1789102" cy="397163"/>
+                <a:off x="5669441" y="3338134"/>
+                <a:ext cx="454564" cy="255489"/>
               </a:xfrm>
-              <a:prstGeom prst="roundRect">
+              <a:prstGeom prst="flowChartDecision">
                 <a:avLst/>
               </a:prstGeom>
-              <a:solidFill>
-                <a:schemeClr val="accent4">
-                  <a:lumMod val="40%"/>
-                  <a:lumOff val="60%"/>
-                </a:schemeClr>
-              </a:solidFill>
               <a:ln>
                 <a:solidFill>
                   <a:schemeClr val="tx1"/>
@@ -14458,15 +15909,15 @@
             </p:spPr>
             <p:style>
               <a:lnRef idx="2">
-                <a:schemeClr val="accent1">
+                <a:schemeClr val="dk1">
                   <a:shade val="50%"/>
                 </a:schemeClr>
               </a:lnRef>
               <a:fillRef idx="1">
-                <a:schemeClr val="accent1"/>
+                <a:schemeClr val="dk1"/>
               </a:fillRef>
               <a:effectRef idx="0">
-                <a:schemeClr val="accent1"/>
+                <a:schemeClr val="dk1"/>
               </a:effectRef>
               <a:fontRef idx="minor">
                 <a:schemeClr val="lt1"/>
@@ -14477,846 +15928,29 @@
               <a:lstStyle/>
               <a:p>
                 <a:pPr algn="ctr"/>
-                <a:r>
-                  <a:rPr lang="it-IT" sz="1400" dirty="0" err="1">
-                    <a:solidFill>
-                      <a:schemeClr val="tx1"/>
-                    </a:solidFill>
-                  </a:rPr>
-                  <a:t>RobotMovesInfo</a:t>
-                </a:r>
-                <a:endParaRPr lang="it-IT" sz="1400" dirty="0">
-                  <a:solidFill>
-                    <a:schemeClr val="tx1"/>
-                  </a:solidFill>
-                </a:endParaRPr>
-              </a:p>
-            </p:txBody>
-          </p:sp>
-          <p:sp>
-            <p:nvSpPr>
-              <p:cNvPr id="5" name="Rettangolo con angoli arrotondati 4">
-                <a:extLst>
-                  <a:ext uri="{FF2B5EF4-FFF2-40B4-BE49-F238E27FC236}">
-                    <a16:creationId xmlns:a16="http://schemas.microsoft.com/office/drawing/2014/main" id="{4C1AFBBB-15CB-48D1-B81E-0C680308DB9D}"/>
-                  </a:ext>
-                </a:extLst>
-              </p:cNvPr>
-              <p:cNvSpPr/>
-              <p:nvPr/>
-            </p:nvSpPr>
-            <p:spPr>
-              <a:xfrm>
-                <a:off x="1729990" y="2909453"/>
-                <a:ext cx="2568071" cy="397163"/>
-              </a:xfrm>
-              <a:prstGeom prst="roundRect">
-                <a:avLst/>
-              </a:prstGeom>
-              <a:solidFill>
-                <a:schemeClr val="accent4">
-                  <a:lumMod val="40%"/>
-                  <a:lumOff val="60%"/>
-                </a:schemeClr>
-              </a:solidFill>
-              <a:ln>
-                <a:solidFill>
-                  <a:schemeClr val="tx1"/>
-                </a:solidFill>
-              </a:ln>
-            </p:spPr>
-            <p:style>
-              <a:lnRef idx="2">
-                <a:schemeClr val="accent1">
-                  <a:shade val="50%"/>
-                </a:schemeClr>
-              </a:lnRef>
-              <a:fillRef idx="1">
-                <a:schemeClr val="accent1"/>
-              </a:fillRef>
-              <a:effectRef idx="0">
-                <a:schemeClr val="accent1"/>
-              </a:effectRef>
-              <a:fontRef idx="minor">
-                <a:schemeClr val="lt1"/>
-              </a:fontRef>
-            </p:style>
-            <p:txBody>
-              <a:bodyPr rtlCol="0" anchor="ctr"/>
-              <a:lstStyle/>
-              <a:p>
-                <a:pPr algn="ctr"/>
-                <a:r>
-                  <a:rPr lang="it-IT" sz="1400" dirty="0" err="1">
-                    <a:solidFill>
-                      <a:schemeClr val="tx1"/>
-                    </a:solidFill>
-                  </a:rPr>
-                  <a:t>RobotBoundaryLogic</a:t>
-                </a:r>
-                <a:endParaRPr lang="it-IT" sz="1400" dirty="0">
-                  <a:solidFill>
-                    <a:schemeClr val="tx1"/>
-                  </a:solidFill>
-                </a:endParaRPr>
-              </a:p>
-            </p:txBody>
-          </p:sp>
-          <p:sp>
-            <p:nvSpPr>
-              <p:cNvPr id="6" name="Rettangolo con angoli arrotondati 5">
-                <a:extLst>
-                  <a:ext uri="{FF2B5EF4-FFF2-40B4-BE49-F238E27FC236}">
-                    <a16:creationId xmlns:a16="http://schemas.microsoft.com/office/drawing/2014/main" id="{7C001593-35D5-40BC-B376-68ECC54B021E}"/>
-                  </a:ext>
-                </a:extLst>
-              </p:cNvPr>
-              <p:cNvSpPr/>
-              <p:nvPr/>
-            </p:nvSpPr>
-            <p:spPr>
-              <a:xfrm>
-                <a:off x="8386632" y="2349836"/>
-                <a:ext cx="1634836" cy="397163"/>
-              </a:xfrm>
-              <a:prstGeom prst="roundRect">
-                <a:avLst/>
-              </a:prstGeom>
-              <a:solidFill>
-                <a:schemeClr val="accent4">
-                  <a:lumMod val="40%"/>
-                  <a:lumOff val="60%"/>
-                </a:schemeClr>
-              </a:solidFill>
-              <a:ln>
-                <a:solidFill>
-                  <a:schemeClr val="tx1"/>
-                </a:solidFill>
-              </a:ln>
-            </p:spPr>
-            <p:style>
-              <a:lnRef idx="2">
-                <a:schemeClr val="accent1">
-                  <a:shade val="50%"/>
-                </a:schemeClr>
-              </a:lnRef>
-              <a:fillRef idx="1">
-                <a:schemeClr val="accent1"/>
-              </a:fillRef>
-              <a:effectRef idx="0">
-                <a:schemeClr val="accent1"/>
-              </a:effectRef>
-              <a:fontRef idx="minor">
-                <a:schemeClr val="lt1"/>
-              </a:fontRef>
-            </p:style>
-            <p:txBody>
-              <a:bodyPr rtlCol="0" anchor="ctr"/>
-              <a:lstStyle/>
-              <a:p>
-                <a:pPr algn="ctr"/>
-                <a:r>
-                  <a:rPr lang="it-IT" sz="1400" dirty="0" err="1">
-                    <a:solidFill>
-                      <a:schemeClr val="tx1"/>
-                    </a:solidFill>
-                  </a:rPr>
-                  <a:t>ConsoleGui</a:t>
-                </a:r>
-                <a:endParaRPr lang="it-IT" sz="1400" dirty="0">
-                  <a:solidFill>
-                    <a:schemeClr val="tx1"/>
-                  </a:solidFill>
-                </a:endParaRPr>
-              </a:p>
-            </p:txBody>
-          </p:sp>
-          <p:sp>
-            <p:nvSpPr>
-              <p:cNvPr id="7" name="Rettangolo con angoli arrotondati 6">
-                <a:extLst>
-                  <a:ext uri="{FF2B5EF4-FFF2-40B4-BE49-F238E27FC236}">
-                    <a16:creationId xmlns:a16="http://schemas.microsoft.com/office/drawing/2014/main" id="{4DE7324D-D696-4FEB-8FCB-AD7C40D6D26D}"/>
-                  </a:ext>
-                </a:extLst>
-              </p:cNvPr>
-              <p:cNvSpPr/>
-              <p:nvPr/>
-            </p:nvSpPr>
-            <p:spPr>
-              <a:xfrm>
-                <a:off x="8386632" y="1596738"/>
-                <a:ext cx="1634836" cy="397163"/>
-              </a:xfrm>
-              <a:prstGeom prst="roundRect">
-                <a:avLst/>
-              </a:prstGeom>
-              <a:solidFill>
-                <a:schemeClr val="accent4">
-                  <a:lumMod val="40%"/>
-                  <a:lumOff val="60%"/>
-                </a:schemeClr>
-              </a:solidFill>
-              <a:ln>
-                <a:solidFill>
-                  <a:schemeClr val="tx1"/>
-                </a:solidFill>
-              </a:ln>
-            </p:spPr>
-            <p:style>
-              <a:lnRef idx="2">
-                <a:schemeClr val="accent1">
-                  <a:shade val="50%"/>
-                </a:schemeClr>
-              </a:lnRef>
-              <a:fillRef idx="1">
-                <a:schemeClr val="accent1"/>
-              </a:fillRef>
-              <a:effectRef idx="0">
-                <a:schemeClr val="accent1"/>
-              </a:effectRef>
-              <a:fontRef idx="minor">
-                <a:schemeClr val="lt1"/>
-              </a:fontRef>
-            </p:style>
-            <p:txBody>
-              <a:bodyPr rtlCol="0" anchor="ctr"/>
-              <a:lstStyle/>
-              <a:p>
-                <a:pPr algn="ctr"/>
-                <a:r>
-                  <a:rPr lang="it-IT" sz="1400" dirty="0">
-                    <a:solidFill>
-                      <a:schemeClr val="tx1"/>
-                    </a:solidFill>
-                  </a:rPr>
-                  <a:t>Observer</a:t>
-                </a:r>
-              </a:p>
-            </p:txBody>
-          </p:sp>
-          <p:sp>
-            <p:nvSpPr>
-              <p:cNvPr id="8" name="Rettangolo con angoli arrotondati 7">
-                <a:extLst>
-                  <a:ext uri="{FF2B5EF4-FFF2-40B4-BE49-F238E27FC236}">
-                    <a16:creationId xmlns:a16="http://schemas.microsoft.com/office/drawing/2014/main" id="{EFCA9A7B-5AAA-4F7A-9954-D969F888DF0C}"/>
-                  </a:ext>
-                </a:extLst>
-              </p:cNvPr>
-              <p:cNvSpPr/>
-              <p:nvPr/>
-            </p:nvSpPr>
-            <p:spPr>
-              <a:xfrm>
-                <a:off x="5212014" y="2909453"/>
-                <a:ext cx="2568071" cy="397163"/>
-              </a:xfrm>
-              <a:prstGeom prst="roundRect">
-                <a:avLst/>
-              </a:prstGeom>
-              <a:solidFill>
-                <a:schemeClr val="accent4">
-                  <a:lumMod val="40%"/>
-                  <a:lumOff val="60%"/>
-                </a:schemeClr>
-              </a:solidFill>
-              <a:ln>
-                <a:solidFill>
-                  <a:schemeClr val="tx1"/>
-                </a:solidFill>
-              </a:ln>
-            </p:spPr>
-            <p:style>
-              <a:lnRef idx="2">
-                <a:schemeClr val="accent1">
-                  <a:shade val="50%"/>
-                </a:schemeClr>
-              </a:lnRef>
-              <a:fillRef idx="1">
-                <a:schemeClr val="accent1"/>
-              </a:fillRef>
-              <a:effectRef idx="0">
-                <a:schemeClr val="accent1"/>
-              </a:effectRef>
-              <a:fontRef idx="minor">
-                <a:schemeClr val="lt1"/>
-              </a:fontRef>
-            </p:style>
-            <p:txBody>
-              <a:bodyPr rtlCol="0" anchor="ctr"/>
-              <a:lstStyle/>
-              <a:p>
-                <a:pPr algn="ctr"/>
-                <a:r>
-                  <a:rPr lang="it-IT" sz="1400" dirty="0" err="1">
-                    <a:solidFill>
-                      <a:schemeClr val="tx1"/>
-                    </a:solidFill>
-                  </a:rPr>
-                  <a:t>RobotInputController</a:t>
-                </a:r>
-                <a:endParaRPr lang="it-IT" sz="1400" dirty="0">
-                  <a:solidFill>
-                    <a:schemeClr val="tx1"/>
-                  </a:solidFill>
-                </a:endParaRPr>
-              </a:p>
-            </p:txBody>
-          </p:sp>
-          <p:sp>
-            <p:nvSpPr>
-              <p:cNvPr id="9" name="Rettangolo con angoli arrotondati 8">
-                <a:extLst>
-                  <a:ext uri="{FF2B5EF4-FFF2-40B4-BE49-F238E27FC236}">
-                    <a16:creationId xmlns:a16="http://schemas.microsoft.com/office/drawing/2014/main" id="{31232ACB-45FF-4ED2-B7C5-6FB67DD19E2D}"/>
-                  </a:ext>
-                </a:extLst>
-              </p:cNvPr>
-              <p:cNvSpPr/>
-              <p:nvPr/>
-            </p:nvSpPr>
-            <p:spPr>
-              <a:xfrm>
-                <a:off x="5263212" y="1596738"/>
-                <a:ext cx="2568071" cy="397163"/>
-              </a:xfrm>
-              <a:prstGeom prst="roundRect">
-                <a:avLst/>
-              </a:prstGeom>
-              <a:solidFill>
-                <a:schemeClr val="accent4">
-                  <a:lumMod val="40%"/>
-                  <a:lumOff val="60%"/>
-                </a:schemeClr>
-              </a:solidFill>
-              <a:ln>
-                <a:solidFill>
-                  <a:schemeClr val="tx1"/>
-                </a:solidFill>
-              </a:ln>
-            </p:spPr>
-            <p:style>
-              <a:lnRef idx="2">
-                <a:schemeClr val="accent1">
-                  <a:shade val="50%"/>
-                </a:schemeClr>
-              </a:lnRef>
-              <a:fillRef idx="1">
-                <a:schemeClr val="accent1"/>
-              </a:fillRef>
-              <a:effectRef idx="0">
-                <a:schemeClr val="accent1"/>
-              </a:effectRef>
-              <a:fontRef idx="minor">
-                <a:schemeClr val="lt1"/>
-              </a:fontRef>
-            </p:style>
-            <p:txBody>
-              <a:bodyPr rtlCol="0" anchor="ctr"/>
-              <a:lstStyle/>
-              <a:p>
-                <a:pPr algn="ctr"/>
-                <a:r>
-                  <a:rPr lang="it-IT" sz="1400" dirty="0" err="1">
-                    <a:solidFill>
-                      <a:schemeClr val="tx1"/>
-                    </a:solidFill>
-                  </a:rPr>
-                  <a:t>ApplicationLayer</a:t>
-                </a:r>
-                <a:endParaRPr lang="it-IT" sz="1400" dirty="0">
-                  <a:solidFill>
-                    <a:schemeClr val="tx1"/>
-                  </a:solidFill>
-                </a:endParaRPr>
-              </a:p>
-            </p:txBody>
-          </p:sp>
-          <p:sp>
-            <p:nvSpPr>
-              <p:cNvPr id="10" name="Rettangolo con angoli arrotondati 9">
-                <a:extLst>
-                  <a:ext uri="{FF2B5EF4-FFF2-40B4-BE49-F238E27FC236}">
-                    <a16:creationId xmlns:a16="http://schemas.microsoft.com/office/drawing/2014/main" id="{2C88D8DE-6640-4FA1-818E-400502DD3A2B}"/>
-                  </a:ext>
-                </a:extLst>
-              </p:cNvPr>
-              <p:cNvSpPr/>
-              <p:nvPr/>
-            </p:nvSpPr>
-            <p:spPr>
-              <a:xfrm>
-                <a:off x="4861214" y="4761345"/>
-                <a:ext cx="1634836" cy="397163"/>
-              </a:xfrm>
-              <a:prstGeom prst="roundRect">
-                <a:avLst/>
-              </a:prstGeom>
-              <a:solidFill>
-                <a:schemeClr val="accent4">
-                  <a:lumMod val="40%"/>
-                  <a:lumOff val="60%"/>
-                </a:schemeClr>
-              </a:solidFill>
-              <a:ln>
-                <a:solidFill>
-                  <a:schemeClr val="tx1"/>
-                </a:solidFill>
-              </a:ln>
-            </p:spPr>
-            <p:style>
-              <a:lnRef idx="2">
-                <a:schemeClr val="accent1">
-                  <a:shade val="50%"/>
-                </a:schemeClr>
-              </a:lnRef>
-              <a:fillRef idx="1">
-                <a:schemeClr val="accent1"/>
-              </a:fillRef>
-              <a:effectRef idx="0">
-                <a:schemeClr val="accent1"/>
-              </a:effectRef>
-              <a:fontRef idx="minor">
-                <a:schemeClr val="lt1"/>
-              </a:fontRef>
-            </p:style>
-            <p:txBody>
-              <a:bodyPr rtlCol="0" anchor="ctr"/>
-              <a:lstStyle/>
-              <a:p>
-                <a:pPr algn="ctr"/>
-                <a:r>
-                  <a:rPr lang="it-IT" sz="1400" dirty="0" err="1">
-                    <a:solidFill>
-                      <a:schemeClr val="tx1"/>
-                    </a:solidFill>
-                  </a:rPr>
-                  <a:t>IssHttpSupport</a:t>
-                </a:r>
-                <a:endParaRPr lang="it-IT" sz="1400" dirty="0">
-                  <a:solidFill>
-                    <a:schemeClr val="tx1"/>
-                  </a:solidFill>
-                </a:endParaRPr>
-              </a:p>
-            </p:txBody>
-          </p:sp>
-          <p:sp>
-            <p:nvSpPr>
-              <p:cNvPr id="11" name="Rettangolo con angoli arrotondati 10">
-                <a:extLst>
-                  <a:ext uri="{FF2B5EF4-FFF2-40B4-BE49-F238E27FC236}">
-                    <a16:creationId xmlns:a16="http://schemas.microsoft.com/office/drawing/2014/main" id="{C8E59A16-548E-4361-9BCF-30B6F1CB89F4}"/>
-                  </a:ext>
-                </a:extLst>
-              </p:cNvPr>
-              <p:cNvSpPr/>
-              <p:nvPr/>
-            </p:nvSpPr>
-            <p:spPr>
-              <a:xfrm>
-                <a:off x="6510770" y="4765963"/>
-                <a:ext cx="1634836" cy="397163"/>
-              </a:xfrm>
-              <a:prstGeom prst="roundRect">
-                <a:avLst/>
-              </a:prstGeom>
-              <a:solidFill>
-                <a:schemeClr val="accent4">
-                  <a:lumMod val="40%"/>
-                  <a:lumOff val="60%"/>
-                </a:schemeClr>
-              </a:solidFill>
-              <a:ln>
-                <a:solidFill>
-                  <a:schemeClr val="tx1"/>
-                </a:solidFill>
-              </a:ln>
-            </p:spPr>
-            <p:style>
-              <a:lnRef idx="2">
-                <a:schemeClr val="accent1">
-                  <a:shade val="50%"/>
-                </a:schemeClr>
-              </a:lnRef>
-              <a:fillRef idx="1">
-                <a:schemeClr val="accent1"/>
-              </a:fillRef>
-              <a:effectRef idx="0">
-                <a:schemeClr val="accent1"/>
-              </a:effectRef>
-              <a:fontRef idx="minor">
-                <a:schemeClr val="lt1"/>
-              </a:fontRef>
-            </p:style>
-            <p:txBody>
-              <a:bodyPr rtlCol="0" anchor="ctr"/>
-              <a:lstStyle/>
-              <a:p>
-                <a:pPr algn="ctr"/>
-                <a:r>
-                  <a:rPr lang="it-IT" sz="1400" dirty="0" err="1">
-                    <a:solidFill>
-                      <a:schemeClr val="tx1"/>
-                    </a:solidFill>
-                  </a:rPr>
-                  <a:t>IssWsSupport</a:t>
-                </a:r>
-                <a:endParaRPr lang="it-IT" sz="1400" dirty="0">
-                  <a:solidFill>
-                    <a:schemeClr val="tx1"/>
-                  </a:solidFill>
-                </a:endParaRPr>
-              </a:p>
-            </p:txBody>
-          </p:sp>
-          <p:sp>
-            <p:nvSpPr>
-              <p:cNvPr id="12" name="Rettangolo con angoli arrotondati 11">
-                <a:extLst>
-                  <a:ext uri="{FF2B5EF4-FFF2-40B4-BE49-F238E27FC236}">
-                    <a16:creationId xmlns:a16="http://schemas.microsoft.com/office/drawing/2014/main" id="{82B6B8CD-F576-4DF6-912F-D663DDD0DFAC}"/>
-                  </a:ext>
-                </a:extLst>
-              </p:cNvPr>
-              <p:cNvSpPr/>
-              <p:nvPr/>
-            </p:nvSpPr>
-            <p:spPr>
-              <a:xfrm>
-                <a:off x="4861214" y="4359564"/>
-                <a:ext cx="3284392" cy="397163"/>
-              </a:xfrm>
-              <a:prstGeom prst="roundRect">
-                <a:avLst/>
-              </a:prstGeom>
-              <a:solidFill>
-                <a:srgbClr val="9AE187"/>
-              </a:solidFill>
-              <a:ln>
-                <a:solidFill>
-                  <a:schemeClr val="tx1"/>
-                </a:solidFill>
-              </a:ln>
-            </p:spPr>
-            <p:style>
-              <a:lnRef idx="2">
-                <a:schemeClr val="accent1">
-                  <a:shade val="50%"/>
-                </a:schemeClr>
-              </a:lnRef>
-              <a:fillRef idx="1">
-                <a:schemeClr val="accent1"/>
-              </a:fillRef>
-              <a:effectRef idx="0">
-                <a:schemeClr val="accent1"/>
-              </a:effectRef>
-              <a:fontRef idx="minor">
-                <a:schemeClr val="lt1"/>
-              </a:fontRef>
-            </p:style>
-            <p:txBody>
-              <a:bodyPr rtlCol="0" anchor="ctr"/>
-              <a:lstStyle/>
-              <a:p>
-                <a:pPr algn="ctr"/>
-                <a:r>
-                  <a:rPr lang="it-IT" sz="1400" dirty="0" err="1">
-                    <a:solidFill>
-                      <a:schemeClr val="tx1"/>
-                    </a:solidFill>
-                  </a:rPr>
-                  <a:t>IssOperations</a:t>
-                </a:r>
-                <a:endParaRPr lang="it-IT" sz="1400" dirty="0">
-                  <a:solidFill>
-                    <a:schemeClr val="tx1"/>
-                  </a:solidFill>
-                </a:endParaRPr>
-              </a:p>
-            </p:txBody>
-          </p:sp>
-          <p:sp>
-            <p:nvSpPr>
-              <p:cNvPr id="13" name="Rettangolo con angoli arrotondati 12">
-                <a:extLst>
-                  <a:ext uri="{FF2B5EF4-FFF2-40B4-BE49-F238E27FC236}">
-                    <a16:creationId xmlns:a16="http://schemas.microsoft.com/office/drawing/2014/main" id="{65F4B05E-EE2A-43AB-81D2-676E1EFF17A0}"/>
-                  </a:ext>
-                </a:extLst>
-              </p:cNvPr>
-              <p:cNvSpPr/>
-              <p:nvPr/>
-            </p:nvSpPr>
-            <p:spPr>
-              <a:xfrm>
-                <a:off x="4853854" y="3948547"/>
-                <a:ext cx="3284392" cy="397163"/>
-              </a:xfrm>
-              <a:prstGeom prst="roundRect">
-                <a:avLst/>
-              </a:prstGeom>
-              <a:solidFill>
-                <a:srgbClr val="9AE187"/>
-              </a:solidFill>
-              <a:ln>
-                <a:solidFill>
-                  <a:schemeClr val="tx1"/>
-                </a:solidFill>
-              </a:ln>
-            </p:spPr>
-            <p:style>
-              <a:lnRef idx="2">
-                <a:schemeClr val="accent1">
-                  <a:shade val="50%"/>
-                </a:schemeClr>
-              </a:lnRef>
-              <a:fillRef idx="1">
-                <a:schemeClr val="accent1"/>
-              </a:fillRef>
-              <a:effectRef idx="0">
-                <a:schemeClr val="accent1"/>
-              </a:effectRef>
-              <a:fontRef idx="minor">
-                <a:schemeClr val="lt1"/>
-              </a:fontRef>
-            </p:style>
-            <p:txBody>
-              <a:bodyPr rtlCol="0" anchor="ctr"/>
-              <a:lstStyle/>
-              <a:p>
-                <a:pPr algn="ctr"/>
-                <a:r>
-                  <a:rPr lang="it-IT" sz="1400" dirty="0" err="1">
-                    <a:solidFill>
-                      <a:schemeClr val="tx1"/>
-                    </a:solidFill>
-                  </a:rPr>
-                  <a:t>IssCommSupport</a:t>
-                </a:r>
-                <a:endParaRPr lang="it-IT" sz="1400" dirty="0">
-                  <a:solidFill>
-                    <a:schemeClr val="tx1"/>
-                  </a:solidFill>
-                </a:endParaRPr>
-              </a:p>
-            </p:txBody>
-          </p:sp>
-          <p:sp>
-            <p:nvSpPr>
-              <p:cNvPr id="14" name="Rettangolo con angoli arrotondati 13">
-                <a:extLst>
-                  <a:ext uri="{FF2B5EF4-FFF2-40B4-BE49-F238E27FC236}">
-                    <a16:creationId xmlns:a16="http://schemas.microsoft.com/office/drawing/2014/main" id="{BC2AF1E7-6E64-41AE-95E5-30743D7F7720}"/>
-                  </a:ext>
-                </a:extLst>
-              </p:cNvPr>
-              <p:cNvSpPr/>
-              <p:nvPr/>
-            </p:nvSpPr>
-            <p:spPr>
-              <a:xfrm>
-                <a:off x="5212014" y="2491510"/>
-                <a:ext cx="2568071" cy="397163"/>
-              </a:xfrm>
-              <a:prstGeom prst="roundRect">
-                <a:avLst/>
-              </a:prstGeom>
-              <a:solidFill>
-                <a:srgbClr val="9AE187"/>
-              </a:solidFill>
-              <a:ln>
-                <a:solidFill>
-                  <a:schemeClr val="tx1"/>
-                </a:solidFill>
-              </a:ln>
-            </p:spPr>
-            <p:style>
-              <a:lnRef idx="2">
-                <a:schemeClr val="accent1">
-                  <a:shade val="50%"/>
-                </a:schemeClr>
-              </a:lnRef>
-              <a:fillRef idx="1">
-                <a:schemeClr val="accent1"/>
-              </a:fillRef>
-              <a:effectRef idx="0">
-                <a:schemeClr val="accent1"/>
-              </a:effectRef>
-              <a:fontRef idx="minor">
-                <a:schemeClr val="lt1"/>
-              </a:fontRef>
-            </p:style>
-            <p:txBody>
-              <a:bodyPr rtlCol="0" anchor="ctr"/>
-              <a:lstStyle/>
-              <a:p>
-                <a:pPr algn="ctr"/>
-                <a:r>
-                  <a:rPr lang="it-IT" sz="1400" dirty="0" err="1">
-                    <a:solidFill>
-                      <a:schemeClr val="tx1"/>
-                    </a:solidFill>
-                  </a:rPr>
-                  <a:t>IssObserver</a:t>
-                </a:r>
-                <a:endParaRPr lang="it-IT" sz="1400" dirty="0">
-                  <a:solidFill>
-                    <a:schemeClr val="tx1"/>
-                  </a:solidFill>
-                </a:endParaRPr>
+                <a:endParaRPr lang="it-IT"/>
               </a:p>
             </p:txBody>
           </p:sp>
           <p:cxnSp>
             <p:nvCxnSpPr>
-              <p:cNvPr id="15" name="Connettore 2 14">
+              <p:cNvPr id="16" name="Connettore 2 15">
                 <a:extLst>
                   <a:ext uri="{FF2B5EF4-FFF2-40B4-BE49-F238E27FC236}">
-                    <a16:creationId xmlns:a16="http://schemas.microsoft.com/office/drawing/2014/main" id="{51123968-1026-42C1-B81C-603F0E62686F}"/>
+                    <a16:creationId xmlns:a16="http://schemas.microsoft.com/office/drawing/2014/main" id="{719C7028-E9FB-4469-80CD-74E8C7CD6DF4}"/>
                   </a:ext>
                 </a:extLst>
               </p:cNvPr>
               <p:cNvCxnSpPr>
-                <a:stCxn id="5" idx="0"/>
-                <a:endCxn id="3" idx="2"/>
-              </p:cNvCxnSpPr>
-              <p:nvPr/>
-            </p:nvCxnSpPr>
-            <p:spPr>
-              <a:xfrm flipH="1" flipV="1">
-                <a:off x="3014025" y="2491510"/>
-                <a:ext cx="1" cy="417943"/>
-              </a:xfrm>
-              <a:prstGeom prst="straightConnector1">
-                <a:avLst/>
-              </a:prstGeom>
-              <a:ln>
-                <a:tailEnd type="triangle"/>
-              </a:ln>
-            </p:spPr>
-            <p:style>
-              <a:lnRef idx="1">
-                <a:schemeClr val="accent1"/>
-              </a:lnRef>
-              <a:fillRef idx="0">
-                <a:schemeClr val="accent1"/>
-              </a:fillRef>
-              <a:effectRef idx="0">
-                <a:schemeClr val="accent1"/>
-              </a:effectRef>
-              <a:fontRef idx="minor">
-                <a:schemeClr val="tx1"/>
-              </a:fontRef>
-            </p:style>
-          </p:cxnSp>
-          <p:cxnSp>
-            <p:nvCxnSpPr>
-              <p:cNvPr id="19" name="Connettore a gomito 18">
-                <a:extLst>
-                  <a:ext uri="{FF2B5EF4-FFF2-40B4-BE49-F238E27FC236}">
-                    <a16:creationId xmlns:a16="http://schemas.microsoft.com/office/drawing/2014/main" id="{A359633E-471A-4476-8780-9709B21201C0}"/>
-                  </a:ext>
-                </a:extLst>
-              </p:cNvPr>
-              <p:cNvCxnSpPr>
-                <a:cxnSpLocks/>
-                <a:stCxn id="5" idx="2"/>
-                <a:endCxn id="13" idx="1"/>
-              </p:cNvCxnSpPr>
-              <p:nvPr/>
-            </p:nvCxnSpPr>
-            <p:spPr>
-              <a:xfrm rot="16200000" flipH="1">
-                <a:off x="3513684" y="2806958"/>
-                <a:ext cx="840513" cy="1839828"/>
-              </a:xfrm>
-              <a:prstGeom prst="bentConnector2">
-                <a:avLst/>
-              </a:prstGeom>
-              <a:ln>
-                <a:tailEnd type="triangle"/>
-              </a:ln>
-            </p:spPr>
-            <p:style>
-              <a:lnRef idx="1">
-                <a:schemeClr val="accent1"/>
-              </a:lnRef>
-              <a:fillRef idx="0">
-                <a:schemeClr val="accent1"/>
-              </a:fillRef>
-              <a:effectRef idx="0">
-                <a:schemeClr val="accent1"/>
-              </a:effectRef>
-              <a:fontRef idx="minor">
-                <a:schemeClr val="tx1"/>
-              </a:fontRef>
-            </p:style>
-          </p:cxnSp>
-          <p:cxnSp>
-            <p:nvCxnSpPr>
-              <p:cNvPr id="22" name="Connettore a gomito 21">
-                <a:extLst>
-                  <a:ext uri="{FF2B5EF4-FFF2-40B4-BE49-F238E27FC236}">
-                    <a16:creationId xmlns:a16="http://schemas.microsoft.com/office/drawing/2014/main" id="{379DE2A5-8423-41A3-B1A7-A9D9BAED8CDD}"/>
-                  </a:ext>
-                </a:extLst>
-              </p:cNvPr>
-              <p:cNvCxnSpPr>
-                <a:cxnSpLocks/>
-                <a:stCxn id="11" idx="3"/>
-                <a:endCxn id="8" idx="3"/>
-              </p:cNvCxnSpPr>
-              <p:nvPr/>
-            </p:nvCxnSpPr>
-            <p:spPr>
-              <a:xfrm flipH="1" flipV="1">
-                <a:off x="7780085" y="3108035"/>
-                <a:ext cx="365521" cy="1856510"/>
-              </a:xfrm>
-              <a:prstGeom prst="bentConnector3">
-                <a:avLst>
-                  <a:gd name="adj1" fmla="val -62541"/>
-                </a:avLst>
-              </a:prstGeom>
-              <a:ln>
-                <a:tailEnd type="triangle"/>
-              </a:ln>
-            </p:spPr>
-            <p:style>
-              <a:lnRef idx="1">
-                <a:schemeClr val="accent1"/>
-              </a:lnRef>
-              <a:fillRef idx="0">
-                <a:schemeClr val="accent1"/>
-              </a:fillRef>
-              <a:effectRef idx="0">
-                <a:schemeClr val="accent1"/>
-              </a:effectRef>
-              <a:fontRef idx="minor">
-                <a:schemeClr val="tx1"/>
-              </a:fontRef>
-            </p:style>
-          </p:cxnSp>
-          <p:cxnSp>
-            <p:nvCxnSpPr>
-              <p:cNvPr id="24" name="Connettore 2 23">
-                <a:extLst>
-                  <a:ext uri="{FF2B5EF4-FFF2-40B4-BE49-F238E27FC236}">
-                    <a16:creationId xmlns:a16="http://schemas.microsoft.com/office/drawing/2014/main" id="{F83AF61D-B247-4416-BD42-618322409149}"/>
-                  </a:ext>
-                </a:extLst>
-              </p:cNvPr>
-              <p:cNvCxnSpPr>
-                <a:cxnSpLocks/>
+                <a:stCxn id="32" idx="2"/>
+                <a:endCxn id="13" idx="0"/>
               </p:cNvCxnSpPr>
               <p:nvPr/>
             </p:nvCxnSpPr>
             <p:spPr>
               <a:xfrm flipH="1">
-                <a:off x="7780085" y="2548418"/>
-                <a:ext cx="606547" cy="512392"/>
+                <a:off x="5857788" y="3593623"/>
+                <a:ext cx="38935" cy="386443"/>
               </a:xfrm>
               <a:prstGeom prst="straightConnector1">
                 <a:avLst/>
@@ -15342,114 +15976,59 @@
           </p:cxnSp>
           <p:sp>
             <p:nvSpPr>
-              <p:cNvPr id="26" name="Triangolo isoscele 25">
+              <p:cNvPr id="38" name="CasellaDiTesto 37">
                 <a:extLst>
                   <a:ext uri="{FF2B5EF4-FFF2-40B4-BE49-F238E27FC236}">
-                    <a16:creationId xmlns:a16="http://schemas.microsoft.com/office/drawing/2014/main" id="{52B72DD5-7ED7-48F4-9794-C0F6B86D544E}"/>
+                    <a16:creationId xmlns:a16="http://schemas.microsoft.com/office/drawing/2014/main" id="{5439C497-6C75-4E55-A942-36A051E6D4E0}"/>
                   </a:ext>
                 </a:extLst>
               </p:cNvPr>
-              <p:cNvSpPr/>
+              <p:cNvSpPr txBox="1"/>
               <p:nvPr/>
             </p:nvSpPr>
             <p:spPr>
               <a:xfrm>
-                <a:off x="9142137" y="2021199"/>
-                <a:ext cx="123825" cy="100446"/>
+                <a:off x="5876203" y="3549396"/>
+                <a:ext cx="276038" cy="307777"/>
               </a:xfrm>
-              <a:prstGeom prst="triangle">
+              <a:prstGeom prst="rect">
                 <a:avLst/>
               </a:prstGeom>
-              <a:solidFill>
-                <a:schemeClr val="bg1"/>
-              </a:solidFill>
+              <a:noFill/>
             </p:spPr>
-            <p:style>
-              <a:lnRef idx="2">
-                <a:schemeClr val="accent1">
-                  <a:shade val="50%"/>
-                </a:schemeClr>
-              </a:lnRef>
-              <a:fillRef idx="1">
-                <a:schemeClr val="accent1"/>
-              </a:fillRef>
-              <a:effectRef idx="0">
-                <a:schemeClr val="accent1"/>
-              </a:effectRef>
-              <a:fontRef idx="minor">
-                <a:schemeClr val="lt1"/>
-              </a:fontRef>
-            </p:style>
             <p:txBody>
-              <a:bodyPr rtlCol="0" anchor="ctr"/>
+              <a:bodyPr wrap="none" rtlCol="0">
+                <a:spAutoFit/>
+              </a:bodyPr>
               <a:lstStyle/>
               <a:p>
-                <a:pPr algn="ctr"/>
-                <a:endParaRPr lang="it-IT"/>
+                <a:r>
+                  <a:rPr lang="it-IT" sz="1400" dirty="0"/>
+                  <a:t>1</a:t>
+                </a:r>
               </a:p>
             </p:txBody>
           </p:sp>
           <p:cxnSp>
             <p:nvCxnSpPr>
-              <p:cNvPr id="28" name="Connettore diritto 27">
+              <p:cNvPr id="21" name="Connettore 2 20">
                 <a:extLst>
                   <a:ext uri="{FF2B5EF4-FFF2-40B4-BE49-F238E27FC236}">
-                    <a16:creationId xmlns:a16="http://schemas.microsoft.com/office/drawing/2014/main" id="{9DC14D0F-D10B-4995-BAF8-3AA848088829}"/>
+                    <a16:creationId xmlns:a16="http://schemas.microsoft.com/office/drawing/2014/main" id="{282CBBD1-DFC9-4999-9767-A7412934615F}"/>
                   </a:ext>
                 </a:extLst>
               </p:cNvPr>
               <p:cNvCxnSpPr>
-                <a:stCxn id="26" idx="3"/>
-                <a:endCxn id="6" idx="0"/>
+                <a:cxnSpLocks/>
+                <a:stCxn id="9" idx="2"/>
+                <a:endCxn id="14" idx="0"/>
               </p:cNvCxnSpPr>
               <p:nvPr/>
             </p:nvCxnSpPr>
             <p:spPr>
               <a:xfrm>
-                <a:off x="9204050" y="2121645"/>
-                <a:ext cx="0" cy="228191"/>
-              </a:xfrm>
-              <a:prstGeom prst="line">
-                <a:avLst/>
-              </a:prstGeom>
-              <a:ln>
-                <a:prstDash val="sysDot"/>
-              </a:ln>
-            </p:spPr>
-            <p:style>
-              <a:lnRef idx="1">
-                <a:schemeClr val="accent1"/>
-              </a:lnRef>
-              <a:fillRef idx="0">
-                <a:schemeClr val="accent1"/>
-              </a:fillRef>
-              <a:effectRef idx="0">
-                <a:schemeClr val="accent1"/>
-              </a:effectRef>
-              <a:fontRef idx="minor">
-                <a:schemeClr val="tx1"/>
-              </a:fontRef>
-            </p:style>
-          </p:cxnSp>
-          <p:cxnSp>
-            <p:nvCxnSpPr>
-              <p:cNvPr id="31" name="Connettore 2 30">
-                <a:extLst>
-                  <a:ext uri="{FF2B5EF4-FFF2-40B4-BE49-F238E27FC236}">
-                    <a16:creationId xmlns:a16="http://schemas.microsoft.com/office/drawing/2014/main" id="{4503135C-3C64-48E6-8E3D-A6A25FA5689C}"/>
-                  </a:ext>
-                </a:extLst>
-              </p:cNvPr>
-              <p:cNvCxnSpPr>
-                <a:stCxn id="8" idx="1"/>
-                <a:endCxn id="5" idx="3"/>
-              </p:cNvCxnSpPr>
-              <p:nvPr/>
-            </p:nvCxnSpPr>
-            <p:spPr>
-              <a:xfrm flipH="1">
-                <a:off x="4298061" y="3108035"/>
-                <a:ext cx="913953" cy="0"/>
+                <a:off x="5857787" y="2042239"/>
+                <a:ext cx="1" cy="480790"/>
               </a:xfrm>
               <a:prstGeom prst="straightConnector1">
                 <a:avLst/>
@@ -15473,96 +16052,12 @@
               </a:fontRef>
             </p:style>
           </p:cxnSp>
-          <p:cxnSp>
-            <p:nvCxnSpPr>
-              <p:cNvPr id="1025" name="Connettore 2 1024">
+          <p:sp>
+            <p:nvSpPr>
+              <p:cNvPr id="41" name="CasellaDiTesto 40">
                 <a:extLst>
                   <a:ext uri="{FF2B5EF4-FFF2-40B4-BE49-F238E27FC236}">
-                    <a16:creationId xmlns:a16="http://schemas.microsoft.com/office/drawing/2014/main" id="{61D5EF5A-4D96-4606-8B26-BF923776AA0B}"/>
-                  </a:ext>
-                </a:extLst>
-              </p:cNvPr>
-              <p:cNvCxnSpPr/>
-              <p:nvPr/>
-            </p:nvCxnSpPr>
-            <p:spPr>
-              <a:xfrm>
-                <a:off x="4755037" y="1348033"/>
-                <a:ext cx="0" cy="887707"/>
-              </a:xfrm>
-              <a:prstGeom prst="straightConnector1">
-                <a:avLst/>
-              </a:prstGeom>
-              <a:ln w="38100">
-                <a:solidFill>
-                  <a:srgbClr val="C00000"/>
-                </a:solidFill>
-                <a:tailEnd type="triangle"/>
-              </a:ln>
-            </p:spPr>
-            <p:style>
-              <a:lnRef idx="1">
-                <a:schemeClr val="accent1"/>
-              </a:lnRef>
-              <a:fillRef idx="0">
-                <a:schemeClr val="accent1"/>
-              </a:fillRef>
-              <a:effectRef idx="0">
-                <a:schemeClr val="accent1"/>
-              </a:effectRef>
-              <a:fontRef idx="minor">
-                <a:schemeClr val="tx1"/>
-              </a:fontRef>
-            </p:style>
-          </p:cxnSp>
-          <p:cxnSp>
-            <p:nvCxnSpPr>
-              <p:cNvPr id="35" name="Connettore 2 34">
-                <a:extLst>
-                  <a:ext uri="{FF2B5EF4-FFF2-40B4-BE49-F238E27FC236}">
-                    <a16:creationId xmlns:a16="http://schemas.microsoft.com/office/drawing/2014/main" id="{3CF860C6-7537-4293-97C2-F93969A44667}"/>
-                  </a:ext>
-                </a:extLst>
-              </p:cNvPr>
-              <p:cNvCxnSpPr/>
-              <p:nvPr/>
-            </p:nvCxnSpPr>
-            <p:spPr>
-              <a:xfrm>
-                <a:off x="3483990" y="4322109"/>
-                <a:ext cx="0" cy="887707"/>
-              </a:xfrm>
-              <a:prstGeom prst="straightConnector1">
-                <a:avLst/>
-              </a:prstGeom>
-              <a:ln w="38100">
-                <a:solidFill>
-                  <a:srgbClr val="C00000"/>
-                </a:solidFill>
-                <a:tailEnd type="triangle"/>
-              </a:ln>
-            </p:spPr>
-            <p:style>
-              <a:lnRef idx="1">
-                <a:schemeClr val="accent1"/>
-              </a:lnRef>
-              <a:fillRef idx="0">
-                <a:schemeClr val="accent1"/>
-              </a:fillRef>
-              <a:effectRef idx="0">
-                <a:schemeClr val="accent1"/>
-              </a:effectRef>
-              <a:fontRef idx="minor">
-                <a:schemeClr val="tx1"/>
-              </a:fontRef>
-            </p:style>
-          </p:cxnSp>
-          <p:sp>
-            <p:nvSpPr>
-              <p:cNvPr id="1027" name="CasellaDiTesto 1026">
-                <a:extLst>
-                  <a:ext uri="{FF2B5EF4-FFF2-40B4-BE49-F238E27FC236}">
-                    <a16:creationId xmlns:a16="http://schemas.microsoft.com/office/drawing/2014/main" id="{16FB3E2D-C44C-4DC9-8C55-A7A2E99B6189}"/>
+                    <a16:creationId xmlns:a16="http://schemas.microsoft.com/office/drawing/2014/main" id="{AAF9AFAA-7DD4-40FA-B501-613D33C504BF}"/>
                   </a:ext>
                 </a:extLst>
               </p:cNvPr>
@@ -15571,8 +16066,8 @@
             </p:nvSpPr>
             <p:spPr>
               <a:xfrm>
-                <a:off x="3012466" y="3772954"/>
-                <a:ext cx="742960" cy="307777"/>
+                <a:off x="5871312" y="2084249"/>
+                <a:ext cx="714106" cy="307777"/>
               </a:xfrm>
               <a:prstGeom prst="rect">
                 <a:avLst/>
@@ -15587,208 +16082,55 @@
               <a:p>
                 <a:r>
                   <a:rPr lang="it-IT" sz="1400" dirty="0" err="1"/>
-                  <a:t>request</a:t>
+                  <a:t>creates</a:t>
                 </a:r>
                 <a:endParaRPr lang="it-IT" sz="1400" dirty="0"/>
               </a:p>
             </p:txBody>
           </p:sp>
-          <p:sp>
-            <p:nvSpPr>
-              <p:cNvPr id="37" name="CasellaDiTesto 36">
-                <a:extLst>
-                  <a:ext uri="{FF2B5EF4-FFF2-40B4-BE49-F238E27FC236}">
-                    <a16:creationId xmlns:a16="http://schemas.microsoft.com/office/drawing/2014/main" id="{228EEE49-1EC4-4712-8FE7-126E8667B31C}"/>
-                  </a:ext>
-                </a:extLst>
-              </p:cNvPr>
-              <p:cNvSpPr txBox="1"/>
-              <p:nvPr/>
-            </p:nvSpPr>
-            <p:spPr>
-              <a:xfrm>
-                <a:off x="8399177" y="3882401"/>
-                <a:ext cx="1371145" cy="307777"/>
-              </a:xfrm>
-              <a:prstGeom prst="rect">
-                <a:avLst/>
-              </a:prstGeom>
-              <a:noFill/>
-            </p:spPr>
-            <p:txBody>
-              <a:bodyPr wrap="none" rtlCol="0">
-                <a:spAutoFit/>
-              </a:bodyPr>
-              <a:lstStyle/>
-              <a:p>
-                <a:r>
-                  <a:rPr lang="it-IT" sz="1400" dirty="0" err="1"/>
-                  <a:t>updateObserver</a:t>
-                </a:r>
-                <a:endParaRPr lang="it-IT" sz="1400" dirty="0"/>
-              </a:p>
-            </p:txBody>
-          </p:sp>
-          <p:sp>
-            <p:nvSpPr>
-              <p:cNvPr id="1031" name="CasellaDiTesto 1030">
-                <a:extLst>
-                  <a:ext uri="{FF2B5EF4-FFF2-40B4-BE49-F238E27FC236}">
-                    <a16:creationId xmlns:a16="http://schemas.microsoft.com/office/drawing/2014/main" id="{3CF1F699-B5D9-4186-B92B-50B8E3EACCB4}"/>
-                  </a:ext>
-                </a:extLst>
-              </p:cNvPr>
-              <p:cNvSpPr txBox="1"/>
-              <p:nvPr/>
-            </p:nvSpPr>
-            <p:spPr>
-              <a:xfrm>
-                <a:off x="5651647" y="5436098"/>
-                <a:ext cx="1245021" cy="369332"/>
-              </a:xfrm>
-              <a:prstGeom prst="rect">
-                <a:avLst/>
-              </a:prstGeom>
-              <a:solidFill>
-                <a:schemeClr val="bg1">
-                  <a:lumMod val="95%"/>
-                </a:schemeClr>
-              </a:solidFill>
-            </p:spPr>
-            <p:txBody>
-              <a:bodyPr wrap="none" rtlCol="0">
-                <a:spAutoFit/>
-              </a:bodyPr>
-              <a:lstStyle/>
-              <a:p>
-                <a:r>
-                  <a:rPr lang="it-IT" dirty="0"/>
-                  <a:t>Application</a:t>
-                </a:r>
-              </a:p>
-            </p:txBody>
-          </p:sp>
         </p:grpSp>
-        <p:grpSp>
-          <p:nvGrpSpPr>
-            <p:cNvPr id="44" name="Gruppo 43">
+        <p:cxnSp>
+          <p:nvCxnSpPr>
+            <p:cNvPr id="39" name="Connettore 2 38">
               <a:extLst>
                 <a:ext uri="{FF2B5EF4-FFF2-40B4-BE49-F238E27FC236}">
-                  <a16:creationId xmlns:a16="http://schemas.microsoft.com/office/drawing/2014/main" id="{F7810F13-9324-4DE4-8353-AF993536CA54}"/>
+                  <a16:creationId xmlns:a16="http://schemas.microsoft.com/office/drawing/2014/main" id="{125530B4-C250-4F2B-8C06-1F4971B06B8A}"/>
                 </a:ext>
               </a:extLst>
             </p:cNvPr>
-            <p:cNvGrpSpPr/>
+            <p:cNvCxnSpPr/>
             <p:nvPr/>
-          </p:nvGrpSpPr>
-          <p:grpSpPr>
+          </p:nvCxnSpPr>
+          <p:spPr>
             <a:xfrm>
-              <a:off x="10490851" y="1217173"/>
-              <a:ext cx="4542595" cy="3761165"/>
-              <a:chOff x="5607844" y="3744728"/>
-              <a:chExt cx="2989330" cy="2475097"/>
+              <a:off x="9633026" y="2025420"/>
+              <a:ext cx="0" cy="887707"/>
             </a:xfrm>
-          </p:grpSpPr>
-          <p:pic>
-            <p:nvPicPr>
-              <p:cNvPr id="45" name="Picture 2" descr="RobotBoundaryArilZooming">
-                <a:extLst>
-                  <a:ext uri="{FF2B5EF4-FFF2-40B4-BE49-F238E27FC236}">
-                    <a16:creationId xmlns:a16="http://schemas.microsoft.com/office/drawing/2014/main" id="{3E6E38D8-FEE8-46A8-83BD-EBE4940A8456}"/>
-                  </a:ext>
-                </a:extLst>
-              </p:cNvPr>
-              <p:cNvPicPr>
-                <a:picLocks noChangeAspect="1" noChangeArrowheads="1"/>
-              </p:cNvPicPr>
-              <p:nvPr/>
-            </p:nvPicPr>
-            <p:blipFill rotWithShape="1">
-              <a:blip r:embed="rId2">
-                <a:extLst>
-                  <a:ext uri="{28A0092B-C50C-407E-A947-70E740481C1C}">
-                    <a14:useLocalDpi xmlns:a14="http://schemas.microsoft.com/office/drawing/2010/main" val="0"/>
-                  </a:ext>
-                </a:extLst>
-              </a:blip>
-              <a:srcRect l="59.996%" b="5.499%"/>
-              <a:stretch/>
-            </p:blipFill>
-            <p:spPr bwMode="auto">
-              <a:xfrm>
-                <a:off x="5610225" y="3744728"/>
-                <a:ext cx="2986949" cy="2475097"/>
-              </a:xfrm>
-              <a:prstGeom prst="rect">
-                <a:avLst/>
-              </a:prstGeom>
-              <a:noFill/>
-              <a:extLst>
-                <a:ext uri="{909E8E84-426E-40DD-AFC4-6F175D3DCCD1}">
-                  <a14:hiddenFill xmlns:a14="http://schemas.microsoft.com/office/drawing/2010/main">
-                    <a:solidFill>
-                      <a:srgbClr val="FFFFFF"/>
-                    </a:solidFill>
-                  </a14:hiddenFill>
-                </a:ext>
-              </a:extLst>
-            </p:spPr>
-          </p:pic>
-          <p:sp>
-            <p:nvSpPr>
-              <p:cNvPr id="46" name="Rettangolo 45">
-                <a:extLst>
-                  <a:ext uri="{FF2B5EF4-FFF2-40B4-BE49-F238E27FC236}">
-                    <a16:creationId xmlns:a16="http://schemas.microsoft.com/office/drawing/2014/main" id="{D43DDD55-5F4F-4E1D-BDC0-440BDEBCDD01}"/>
-                  </a:ext>
-                </a:extLst>
-              </p:cNvPr>
-              <p:cNvSpPr/>
-              <p:nvPr/>
-            </p:nvSpPr>
-            <p:spPr>
-              <a:xfrm>
-                <a:off x="5607844" y="5281613"/>
-                <a:ext cx="240507" cy="169068"/>
-              </a:xfrm>
-              <a:prstGeom prst="rect">
-                <a:avLst/>
-              </a:prstGeom>
+            <a:prstGeom prst="straightConnector1">
+              <a:avLst/>
+            </a:prstGeom>
+            <a:ln w="38100">
               <a:solidFill>
-                <a:schemeClr val="bg1"/>
+                <a:srgbClr val="C00000"/>
               </a:solidFill>
-              <a:ln>
-                <a:solidFill>
-                  <a:schemeClr val="bg1"/>
-                </a:solidFill>
-              </a:ln>
-            </p:spPr>
-            <p:style>
-              <a:lnRef idx="2">
-                <a:schemeClr val="accent1">
-                  <a:shade val="50%"/>
-                </a:schemeClr>
-              </a:lnRef>
-              <a:fillRef idx="1">
-                <a:schemeClr val="accent1"/>
-              </a:fillRef>
-              <a:effectRef idx="0">
-                <a:schemeClr val="accent1"/>
-              </a:effectRef>
-              <a:fontRef idx="minor">
-                <a:schemeClr val="lt1"/>
-              </a:fontRef>
-            </p:style>
-            <p:txBody>
-              <a:bodyPr rtlCol="0" anchor="ctr"/>
-              <a:lstStyle/>
-              <a:p>
-                <a:pPr algn="ctr"/>
-                <a:endParaRPr lang="it-IT"/>
-              </a:p>
-            </p:txBody>
-          </p:sp>
-        </p:grpSp>
+              <a:tailEnd type="triangle"/>
+            </a:ln>
+          </p:spPr>
+          <p:style>
+            <a:lnRef idx="1">
+              <a:schemeClr val="accent1"/>
+            </a:lnRef>
+            <a:fillRef idx="0">
+              <a:schemeClr val="accent1"/>
+            </a:fillRef>
+            <a:effectRef idx="0">
+              <a:schemeClr val="accent1"/>
+            </a:effectRef>
+            <a:fontRef idx="minor">
+              <a:schemeClr val="tx1"/>
+            </a:fontRef>
+          </p:style>
+        </p:cxnSp>
       </p:grpSp>
     </p:spTree>
     <p:extLst>

</xml_diff>